<commit_message>
added footnotes to Notes section of PPT
</commit_message>
<xml_diff>
--- a/DS 202 Final Presentation.pptx
+++ b/DS 202 Final Presentation.pptx
@@ -2212,7 +2212,7 @@
         <a:p>
           <a:r>
             <a:rPr lang="en-US" dirty="0"/>
-            <a:t>Originally had 71 columns: Country, Notes, 1949, … , 2017 </a:t>
+            <a:t>Current USD for example, had 71 columns: Country, Notes, 1949, … , 2017 </a:t>
           </a:r>
         </a:p>
       </dgm:t>
@@ -2254,7 +2254,7 @@
         <a:p>
           <a:r>
             <a:rPr lang="en-US" dirty="0"/>
-            <a:t>Introduced variable in military and map data frames </a:t>
+            <a:t>Had to input iso3c manually for some countries</a:t>
           </a:r>
         </a:p>
       </dgm:t>
@@ -2296,7 +2296,7 @@
         <a:p>
           <a:r>
             <a:rPr lang="en-US" dirty="0"/>
-            <a:t>Joined military data with world map data</a:t>
+            <a:t>Joined military expenditure data with world map data</a:t>
           </a:r>
         </a:p>
       </dgm:t>
@@ -2379,12 +2379,8 @@
         <a:lstStyle/>
         <a:p>
           <a:r>
-            <a:rPr lang="en-US"/>
-            <a:t>Introduced </a:t>
-          </a:r>
-          <a:r>
             <a:rPr lang="en-US" dirty="0"/>
-            <a:t>new variable ‘iso3c’ country code</a:t>
+            <a:t>Introduced new variable ‘iso3c’ country code</a:t>
           </a:r>
         </a:p>
       </dgm:t>
@@ -2392,6 +2388,13 @@
     <dgm:pt modelId="{FC8EE8AB-F297-44D2-9E19-F678FAE06792}" type="parTrans" cxnId="{204D97CF-9536-4388-A5C6-26BA1DA37C75}">
       <dgm:prSet/>
       <dgm:spPr/>
+      <dgm:t>
+        <a:bodyPr/>
+        <a:lstStyle/>
+        <a:p>
+          <a:endParaRPr lang="en-US"/>
+        </a:p>
+      </dgm:t>
     </dgm:pt>
     <dgm:pt modelId="{ABE921DE-29C1-4F00-A3DF-D068612ADD33}" type="sibTrans" cxnId="{204D97CF-9536-4388-A5C6-26BA1DA37C75}">
       <dgm:prSet/>
@@ -3481,7 +3484,7 @@
           </a:pPr>
           <a:r>
             <a:rPr lang="en-US" sz="1500" kern="1200" dirty="0"/>
-            <a:t>Originally had 71 columns: Country, Notes, 1949, … , 2017 </a:t>
+            <a:t>Current USD for example, had 71 columns: Country, Notes, 1949, … , 2017 </a:t>
           </a:r>
         </a:p>
       </dsp:txBody>
@@ -3634,12 +3637,8 @@
             <a:buNone/>
           </a:pPr>
           <a:r>
-            <a:rPr lang="en-US" sz="1900" kern="1200"/>
-            <a:t>Introduced </a:t>
-          </a:r>
-          <a:r>
             <a:rPr lang="en-US" sz="1900" kern="1200" dirty="0"/>
-            <a:t>new variable ‘iso3c’ country code</a:t>
+            <a:t>Introduced new variable ‘iso3c’ country code</a:t>
           </a:r>
         </a:p>
         <a:p>
@@ -3657,7 +3656,7 @@
           </a:pPr>
           <a:r>
             <a:rPr lang="en-US" sz="1500" kern="1200" dirty="0"/>
-            <a:t>Introduced variable in military and map data frames </a:t>
+            <a:t>Had to input iso3c manually for some countries</a:t>
           </a:r>
         </a:p>
       </dsp:txBody>
@@ -3734,7 +3733,7 @@
           </a:pPr>
           <a:r>
             <a:rPr lang="en-US" sz="1900" kern="1200" dirty="0"/>
-            <a:t>Joined military data with world map data</a:t>
+            <a:t>Joined military expenditure data with world map data</a:t>
           </a:r>
         </a:p>
         <a:p>
@@ -8345,6 +8344,46 @@
             </a:r>
           </a:p>
           <a:p>
+            <a:pPr marL="628650" lvl="1" indent="-171450">
+              <a:buFont typeface="Arial" panose="020B0604020202020204" pitchFamily="34" charset="0"/>
+              <a:buChar char="•"/>
+            </a:pPr>
+            <a:r>
+              <a:rPr lang="en-US" i="1" dirty="0">
+                <a:solidFill>
+                  <a:schemeClr val="bg1">
+                    <a:lumMod val="65000"/>
+                  </a:schemeClr>
+                </a:solidFill>
+              </a:rPr>
+              <a:t>“</a:t>
+            </a:r>
+            <a:r>
+              <a:rPr lang="en-US" sz="1200" b="0" i="1" u="none" strike="noStrike" kern="1200" dirty="0">
+                <a:solidFill>
+                  <a:schemeClr val="bg1">
+                    <a:lumMod val="65000"/>
+                  </a:schemeClr>
+                </a:solidFill>
+                <a:effectLst/>
+                <a:latin typeface="+mn-lt"/>
+                <a:ea typeface="+mn-ea"/>
+                <a:cs typeface="+mn-cs"/>
+              </a:rPr>
+              <a:t>Arms transfers cover the supply of military weapons through sales, aid, gifts, and those made through manufacturing licenses. Data cover major conventional weapons such as aircraft, armored vehicles, artillery, radar systems, missiles, and ships designed for military use. Excluded are transfers of other military equipment such as small arms and light weapons, trucks, small artillery, ammunition, support equipment, technology transfers, and other services. Figures are SIPRI Trend Indicator Values (TIVs) expressed in US$ m. at constant (1990) prices. A '0' indicates that the value of deliveries is less than US$0.5m.</a:t>
+            </a:r>
+            <a:r>
+              <a:rPr lang="en-US" i="1" dirty="0">
+                <a:solidFill>
+                  <a:schemeClr val="bg1">
+                    <a:lumMod val="65000"/>
+                  </a:schemeClr>
+                </a:solidFill>
+              </a:rPr>
+              <a:t> “</a:t>
+            </a:r>
+          </a:p>
+          <a:p>
             <a:pPr marL="171450" lvl="0" indent="-171450">
               <a:buFont typeface="Arial" panose="020B0604020202020204" pitchFamily="34" charset="0"/>
               <a:buChar char="•"/>
@@ -8362,6 +8401,56 @@
             <a:r>
               <a:rPr lang="en-US" dirty="0"/>
               <a:t>Presents the armed forces personnel, as a percentage of total labor force. (Data ranges from 1990 to 2016)</a:t>
+            </a:r>
+          </a:p>
+          <a:p>
+            <a:pPr marL="628650" lvl="1" indent="-171450">
+              <a:buFont typeface="Arial" panose="020B0604020202020204" pitchFamily="34" charset="0"/>
+              <a:buChar char="•"/>
+            </a:pPr>
+            <a:r>
+              <a:rPr lang="en-US" i="1" dirty="0"/>
+              <a:t>“</a:t>
+            </a:r>
+            <a:r>
+              <a:rPr lang="en-US" sz="1200" b="0" i="1" u="none" strike="noStrike" kern="1200" dirty="0">
+                <a:solidFill>
+                  <a:schemeClr val="tx1"/>
+                </a:solidFill>
+                <a:effectLst/>
+                <a:latin typeface="+mn-lt"/>
+                <a:ea typeface="+mn-ea"/>
+                <a:cs typeface="+mn-cs"/>
+              </a:rPr>
+              <a:t>Armed forces personnel are active duty military personnel, including paramilitary forces if the training, organization, equipment, and control suggest they may be used to support or replace regular military forces. Labor force comprises all people who meet the International </a:t>
+            </a:r>
+            <a:r>
+              <a:rPr lang="en-US" sz="1200" b="0" i="1" u="none" strike="noStrike" kern="1200" dirty="0" err="1">
+                <a:solidFill>
+                  <a:schemeClr val="tx1"/>
+                </a:solidFill>
+                <a:effectLst/>
+                <a:latin typeface="+mn-lt"/>
+                <a:ea typeface="+mn-ea"/>
+                <a:cs typeface="+mn-cs"/>
+              </a:rPr>
+              <a:t>Labour</a:t>
+            </a:r>
+            <a:r>
+              <a:rPr lang="en-US" sz="1200" b="0" i="1" u="none" strike="noStrike" kern="1200" dirty="0">
+                <a:solidFill>
+                  <a:schemeClr val="tx1"/>
+                </a:solidFill>
+                <a:effectLst/>
+                <a:latin typeface="+mn-lt"/>
+                <a:ea typeface="+mn-ea"/>
+                <a:cs typeface="+mn-cs"/>
+              </a:rPr>
+              <a:t> Organization's definition of the economically active population.</a:t>
+            </a:r>
+            <a:r>
+              <a:rPr lang="en-US" i="1" dirty="0"/>
+              <a:t> “</a:t>
             </a:r>
           </a:p>
           <a:p>
@@ -8456,54 +8545,11 @@
           <a:bodyPr/>
           <a:lstStyle/>
           <a:p>
-            <a:pPr marL="171450" indent="-171450">
+            <a:pPr marL="0" indent="0">
               <a:buFont typeface="Arial" panose="020B0604020202020204" pitchFamily="34" charset="0"/>
-              <a:buChar char="•"/>
+              <a:buNone/>
             </a:pPr>
-            <a:r>
-              <a:rPr lang="en-US" dirty="0"/>
-              <a:t>We tried loading the data before removing the pictures and links that were included in the Excel file and ran into issues. </a:t>
-            </a:r>
-          </a:p>
-          <a:p>
-            <a:pPr marL="628650" lvl="1" indent="-171450">
-              <a:buFont typeface="Arial" panose="020B0604020202020204" pitchFamily="34" charset="0"/>
-              <a:buChar char="•"/>
-            </a:pPr>
-            <a:r>
-              <a:rPr lang="en-US" dirty="0"/>
-              <a:t>Instead, we chose to remove the pictures and links from the Excel file before loading the data into R.</a:t>
-            </a:r>
-          </a:p>
-          <a:p>
-            <a:pPr marL="171450" lvl="0" indent="-171450">
-              <a:buFont typeface="Arial" panose="020B0604020202020204" pitchFamily="34" charset="0"/>
-              <a:buChar char="•"/>
-            </a:pPr>
-            <a:r>
-              <a:rPr lang="en-US" dirty="0"/>
-              <a:t>Before gathering the columns, the data frame from the “Current US$” sheet had 71 columns: Country, Notes, and then a column for each year from 1949 to 2017.</a:t>
-            </a:r>
-          </a:p>
-          <a:p>
-            <a:pPr marL="628650" lvl="1" indent="-171450">
-              <a:buFont typeface="Arial" panose="020B0604020202020204" pitchFamily="34" charset="0"/>
-              <a:buChar char="•"/>
-            </a:pPr>
-            <a:r>
-              <a:rPr lang="en-US" dirty="0"/>
-              <a:t>After gathering the columns, the resulting data frame had 7472 rows and 4 columns: Country, Notes, Year, and Value</a:t>
-            </a:r>
-          </a:p>
-          <a:p>
-            <a:pPr marL="171450" lvl="0" indent="-171450">
-              <a:buFont typeface="Arial" panose="020B0604020202020204" pitchFamily="34" charset="0"/>
-              <a:buChar char="•"/>
-            </a:pPr>
-            <a:r>
-              <a:rPr lang="en-US" dirty="0"/>
-              <a:t>Finally, we changed the “Year” and “Value” variables to be numeric types</a:t>
-            </a:r>
+            <a:endParaRPr lang="en-US" dirty="0"/>
           </a:p>
         </p:txBody>
       </p:sp>
@@ -8534,6 +8580,2137 @@
     <p:extLst>
       <p:ext uri="{BB962C8B-B14F-4D97-AF65-F5344CB8AC3E}">
         <p14:creationId xmlns:p14="http://schemas.microsoft.com/office/powerpoint/2010/main" val="2012960402"/>
+      </p:ext>
+    </p:extLst>
+  </p:cSld>
+  <p:clrMapOvr>
+    <a:masterClrMapping/>
+  </p:clrMapOvr>
+</p:notes>
+</file>
+
+<file path=ppt/notesSlides/notesSlide4.xml><?xml version="1.0" encoding="utf-8"?>
+<p:notes xmlns:a="http://schemas.openxmlformats.org/drawingml/2006/main" xmlns:r="http://schemas.openxmlformats.org/officeDocument/2006/relationships" xmlns:p="http://schemas.openxmlformats.org/presentationml/2006/main">
+  <p:cSld>
+    <p:spTree>
+      <p:nvGrpSpPr>
+        <p:cNvPr id="1" name=""/>
+        <p:cNvGrpSpPr/>
+        <p:nvPr/>
+      </p:nvGrpSpPr>
+      <p:grpSpPr>
+        <a:xfrm>
+          <a:off x="0" y="0"/>
+          <a:ext cx="0" cy="0"/>
+          <a:chOff x="0" y="0"/>
+          <a:chExt cx="0" cy="0"/>
+        </a:xfrm>
+      </p:grpSpPr>
+      <p:sp>
+        <p:nvSpPr>
+          <p:cNvPr id="2" name="Slide Image Placeholder 1"/>
+          <p:cNvSpPr>
+            <a:spLocks noGrp="1" noRot="1" noChangeAspect="1"/>
+          </p:cNvSpPr>
+          <p:nvPr>
+            <p:ph type="sldImg"/>
+          </p:nvPr>
+        </p:nvSpPr>
+        <p:spPr/>
+      </p:sp>
+      <p:sp>
+        <p:nvSpPr>
+          <p:cNvPr id="3" name="Notes Placeholder 2"/>
+          <p:cNvSpPr>
+            <a:spLocks noGrp="1"/>
+          </p:cNvSpPr>
+          <p:nvPr>
+            <p:ph type="body" idx="1"/>
+          </p:nvPr>
+        </p:nvSpPr>
+        <p:spPr/>
+        <p:txBody>
+          <a:bodyPr/>
+          <a:lstStyle/>
+          <a:p>
+            <a:r>
+              <a:rPr lang="en-US" sz="1200" b="1" i="0" u="none" strike="noStrike" kern="1200" dirty="0">
+                <a:solidFill>
+                  <a:schemeClr val="tx1"/>
+                </a:solidFill>
+                <a:effectLst/>
+                <a:latin typeface="+mn-lt"/>
+                <a:ea typeface="+mn-ea"/>
+                <a:cs typeface="+mn-cs"/>
+              </a:rPr>
+              <a:t>China: </a:t>
+            </a:r>
+            <a:r>
+              <a:rPr lang="en-US" sz="1200" b="0" i="0" u="none" strike="noStrike" kern="1200" dirty="0">
+                <a:solidFill>
+                  <a:schemeClr val="tx1"/>
+                </a:solidFill>
+                <a:effectLst/>
+                <a:latin typeface="+mn-lt"/>
+                <a:ea typeface="+mn-ea"/>
+                <a:cs typeface="+mn-cs"/>
+              </a:rPr>
+              <a:t>The figures for China have been revised in this edition of the database based on revised estimates for additional military research &amp; development spending. The figures are for estimated total military expenditure, including estimates for items not included in the official </a:t>
+            </a:r>
+            <a:r>
+              <a:rPr lang="en-US" sz="1200" b="0" i="0" u="none" strike="noStrike" kern="1200" dirty="0" err="1">
+                <a:solidFill>
+                  <a:schemeClr val="tx1"/>
+                </a:solidFill>
+                <a:effectLst/>
+                <a:latin typeface="+mn-lt"/>
+                <a:ea typeface="+mn-ea"/>
+                <a:cs typeface="+mn-cs"/>
+              </a:rPr>
+              <a:t>defence</a:t>
+            </a:r>
+            <a:r>
+              <a:rPr lang="en-US" sz="1200" b="0" i="0" u="none" strike="noStrike" kern="1200" dirty="0">
+                <a:solidFill>
+                  <a:schemeClr val="tx1"/>
+                </a:solidFill>
+                <a:effectLst/>
+                <a:latin typeface="+mn-lt"/>
+                <a:ea typeface="+mn-ea"/>
+                <a:cs typeface="+mn-cs"/>
+              </a:rPr>
+              <a:t> budget. On the estimates in local currency and as share of GDP for the period 1989-96, see </a:t>
+            </a:r>
+            <a:r>
+              <a:rPr lang="en-US" sz="1200" b="0" i="0" u="none" strike="noStrike" kern="1200" dirty="0" err="1">
+                <a:solidFill>
+                  <a:schemeClr val="tx1"/>
+                </a:solidFill>
+                <a:effectLst/>
+                <a:latin typeface="+mn-lt"/>
+                <a:ea typeface="+mn-ea"/>
+                <a:cs typeface="+mn-cs"/>
+              </a:rPr>
+              <a:t>Shaoguang</a:t>
+            </a:r>
+            <a:r>
+              <a:rPr lang="en-US" sz="1200" b="0" i="0" u="none" strike="noStrike" kern="1200" dirty="0">
+                <a:solidFill>
+                  <a:schemeClr val="tx1"/>
+                </a:solidFill>
+                <a:effectLst/>
+                <a:latin typeface="+mn-lt"/>
+                <a:ea typeface="+mn-ea"/>
+                <a:cs typeface="+mn-cs"/>
+              </a:rPr>
+              <a:t> Wang, The military expenditure of China, 1989 to 98, SIPRI Yearbook 1999: Armaments, Disarmament and International Security (Oxford University Press: Oxford, 1999), pp. 349. The estimates for the years 1997-2017 are based on publicly-available figures for official military expenditure and some other items, and estimates for other items based on Prof. Wang's methodology or other methods based on new information.  For the most recent years, where no official data is available for certain items, estimates are based on either the percentage change in official military expenditure, recent trends in spending in the same category, and in the case of the commercial earnings of the Peoples Liberation Army (PLA), on the assumption of a gradual decrease. See Sources and Methods, http://www.sipri.org/research/armaments/milex/milex_database/copy_of_sources_methods</a:t>
+            </a:r>
+            <a:r>
+              <a:rPr lang="en-US" dirty="0"/>
+              <a:t> </a:t>
+            </a:r>
+          </a:p>
+          <a:p>
+            <a:endParaRPr lang="en-US" dirty="0"/>
+          </a:p>
+          <a:p>
+            <a:r>
+              <a:rPr lang="en-US" sz="1200" b="1" i="0" u="none" strike="noStrike" kern="1200" dirty="0">
+                <a:solidFill>
+                  <a:schemeClr val="tx1"/>
+                </a:solidFill>
+                <a:effectLst/>
+                <a:latin typeface="+mn-lt"/>
+                <a:ea typeface="+mn-ea"/>
+                <a:cs typeface="+mn-cs"/>
+              </a:rPr>
+              <a:t>France: </a:t>
+            </a:r>
+            <a:r>
+              <a:rPr lang="en-US" sz="1200" b="0" i="0" u="none" strike="noStrike" kern="1200" dirty="0">
+                <a:solidFill>
+                  <a:schemeClr val="tx1"/>
+                </a:solidFill>
+                <a:effectLst/>
+                <a:latin typeface="+mn-lt"/>
+                <a:ea typeface="+mn-ea"/>
+                <a:cs typeface="+mn-cs"/>
+              </a:rPr>
+              <a:t>The figures for France from 2006 are calculated with a new methodology due to a change in the French budgetary system and financial law. Military spending includes a supplementary budget of 1.5 bn euros extra allocated to "</a:t>
+            </a:r>
+            <a:r>
+              <a:rPr lang="en-US" sz="1200" b="0" i="0" u="none" strike="noStrike" kern="1200" dirty="0" err="1">
+                <a:solidFill>
+                  <a:schemeClr val="tx1"/>
+                </a:solidFill>
+                <a:effectLst/>
+                <a:latin typeface="+mn-lt"/>
+                <a:ea typeface="+mn-ea"/>
+                <a:cs typeface="+mn-cs"/>
+              </a:rPr>
+              <a:t>defence</a:t>
+            </a:r>
+            <a:r>
+              <a:rPr lang="en-US" sz="1200" b="0" i="0" u="none" strike="noStrike" kern="1200" dirty="0">
+                <a:solidFill>
+                  <a:schemeClr val="tx1"/>
+                </a:solidFill>
+                <a:effectLst/>
+                <a:latin typeface="+mn-lt"/>
+                <a:ea typeface="+mn-ea"/>
+                <a:cs typeface="+mn-cs"/>
+              </a:rPr>
+              <a:t>" in 2016 and 700 mil euros in 2017. This is added to the original </a:t>
+            </a:r>
+            <a:r>
+              <a:rPr lang="en-US" sz="1200" b="0" i="0" u="none" strike="noStrike" kern="1200" dirty="0" err="1">
+                <a:solidFill>
+                  <a:schemeClr val="tx1"/>
+                </a:solidFill>
+                <a:effectLst/>
+                <a:latin typeface="+mn-lt"/>
+                <a:ea typeface="+mn-ea"/>
+                <a:cs typeface="+mn-cs"/>
+              </a:rPr>
+              <a:t>LdF</a:t>
+            </a:r>
+            <a:r>
+              <a:rPr lang="en-US" sz="1200" b="0" i="0" u="none" strike="noStrike" kern="1200" dirty="0">
+                <a:solidFill>
+                  <a:schemeClr val="tx1"/>
+                </a:solidFill>
+                <a:effectLst/>
+                <a:latin typeface="+mn-lt"/>
+                <a:ea typeface="+mn-ea"/>
+                <a:cs typeface="+mn-cs"/>
+              </a:rPr>
+              <a:t> budget.</a:t>
+            </a:r>
+            <a:r>
+              <a:rPr lang="en-US" dirty="0"/>
+              <a:t> </a:t>
+            </a:r>
+          </a:p>
+          <a:p>
+            <a:endParaRPr lang="en-US" dirty="0"/>
+          </a:p>
+          <a:p>
+            <a:r>
+              <a:rPr lang="en-US" sz="1200" b="1" i="0" u="none" strike="noStrike" kern="1200" dirty="0">
+                <a:solidFill>
+                  <a:schemeClr val="tx1"/>
+                </a:solidFill>
+                <a:effectLst/>
+                <a:latin typeface="+mn-lt"/>
+                <a:ea typeface="+mn-ea"/>
+                <a:cs typeface="+mn-cs"/>
+              </a:rPr>
+              <a:t>India: </a:t>
+            </a:r>
+            <a:r>
+              <a:rPr lang="en-US" sz="1200" b="0" i="0" u="none" strike="noStrike" kern="1200" dirty="0">
+                <a:solidFill>
+                  <a:schemeClr val="tx1"/>
+                </a:solidFill>
+                <a:effectLst/>
+                <a:latin typeface="+mn-lt"/>
+                <a:ea typeface="+mn-ea"/>
+                <a:cs typeface="+mn-cs"/>
+              </a:rPr>
+              <a:t>The figures for India include expenditure on the paramilitary forces of the Border Security Force, the Central Reserve Police Force, the Assam Rifles, the Indo-Tibetan Border Police and, from 2007 the </a:t>
+            </a:r>
+            <a:r>
+              <a:rPr lang="en-US" sz="1200" b="0" i="0" u="none" strike="noStrike" kern="1200" dirty="0" err="1">
+                <a:solidFill>
+                  <a:schemeClr val="tx1"/>
+                </a:solidFill>
+                <a:effectLst/>
+                <a:latin typeface="+mn-lt"/>
+                <a:ea typeface="+mn-ea"/>
+                <a:cs typeface="+mn-cs"/>
+              </a:rPr>
+              <a:t>Sashastra</a:t>
+            </a:r>
+            <a:r>
+              <a:rPr lang="en-US" sz="1200" b="0" i="0" u="none" strike="noStrike" kern="1200" dirty="0">
+                <a:solidFill>
+                  <a:schemeClr val="tx1"/>
+                </a:solidFill>
+                <a:effectLst/>
+                <a:latin typeface="+mn-lt"/>
+                <a:ea typeface="+mn-ea"/>
+                <a:cs typeface="+mn-cs"/>
+              </a:rPr>
+              <a:t> Seema Bal but do not include spending on military nuclear activities.</a:t>
+            </a:r>
+            <a:r>
+              <a:rPr lang="en-US" dirty="0"/>
+              <a:t> </a:t>
+            </a:r>
+          </a:p>
+          <a:p>
+            <a:endParaRPr lang="en-US" b="1" dirty="0"/>
+          </a:p>
+          <a:p>
+            <a:r>
+              <a:rPr lang="en-US" sz="1200" b="1" i="0" u="none" strike="noStrike" kern="1200" dirty="0">
+                <a:solidFill>
+                  <a:schemeClr val="tx1"/>
+                </a:solidFill>
+                <a:effectLst/>
+                <a:latin typeface="+mn-lt"/>
+                <a:ea typeface="+mn-ea"/>
+                <a:cs typeface="+mn-cs"/>
+              </a:rPr>
+              <a:t>Russia: </a:t>
+            </a:r>
+            <a:r>
+              <a:rPr lang="en-US" sz="1200" b="0" i="0" u="none" strike="noStrike" kern="1200" dirty="0">
+                <a:solidFill>
+                  <a:schemeClr val="tx1"/>
+                </a:solidFill>
+                <a:effectLst/>
+                <a:latin typeface="+mn-lt"/>
+                <a:ea typeface="+mn-ea"/>
+                <a:cs typeface="+mn-cs"/>
+              </a:rPr>
+              <a:t>For the sources and methods of the military expenditure figures for the USSR and Russia, see Cooper, J., 'The military expenditure of the USSR and the Russian Federation, 1987–97', SIPRI Yearbook 1998: Armaments, Disarmament and International Security (Oxford University Press: Oxford, 1998), appendix 6D, pp. 243–59.</a:t>
+            </a:r>
+            <a:r>
+              <a:rPr lang="en-US" dirty="0"/>
+              <a:t> </a:t>
+            </a:r>
+          </a:p>
+          <a:p>
+            <a:endParaRPr lang="en-US" dirty="0"/>
+          </a:p>
+          <a:p>
+            <a:r>
+              <a:rPr lang="en-US" sz="1200" b="1" i="0" u="none" strike="noStrike" kern="1200" dirty="0">
+                <a:solidFill>
+                  <a:schemeClr val="tx1"/>
+                </a:solidFill>
+                <a:effectLst/>
+                <a:latin typeface="+mn-lt"/>
+                <a:ea typeface="+mn-ea"/>
+                <a:cs typeface="+mn-cs"/>
+              </a:rPr>
+              <a:t>USA: </a:t>
+            </a:r>
+            <a:r>
+              <a:rPr lang="en-US" sz="1200" b="0" i="0" u="none" strike="noStrike" kern="1200" dirty="0">
+                <a:solidFill>
+                  <a:schemeClr val="tx1"/>
+                </a:solidFill>
+                <a:effectLst/>
+                <a:latin typeface="+mn-lt"/>
+                <a:ea typeface="+mn-ea"/>
+                <a:cs typeface="+mn-cs"/>
+              </a:rPr>
+              <a:t>All figures for the USA are for financial year (1 Oct. of the previous year-30 Sep. of the stated year) rather than calendar year.</a:t>
+            </a:r>
+            <a:r>
+              <a:rPr lang="en-US" dirty="0"/>
+              <a:t> </a:t>
+            </a:r>
+          </a:p>
+          <a:p>
+            <a:endParaRPr lang="en-US" dirty="0"/>
+          </a:p>
+          <a:p>
+            <a:r>
+              <a:rPr lang="en-US" sz="1200" b="1" i="0" u="none" strike="noStrike" kern="1200" dirty="0">
+                <a:solidFill>
+                  <a:schemeClr val="tx1"/>
+                </a:solidFill>
+                <a:effectLst/>
+                <a:latin typeface="+mn-lt"/>
+                <a:ea typeface="+mn-ea"/>
+                <a:cs typeface="+mn-cs"/>
+              </a:rPr>
+              <a:t>Estonia: </a:t>
+            </a:r>
+            <a:r>
+              <a:rPr lang="en-US" sz="1200" b="0" i="0" u="none" strike="noStrike" kern="1200" dirty="0">
+                <a:solidFill>
+                  <a:schemeClr val="tx1"/>
+                </a:solidFill>
+                <a:effectLst/>
+                <a:latin typeface="+mn-lt"/>
+                <a:ea typeface="+mn-ea"/>
+                <a:cs typeface="+mn-cs"/>
+              </a:rPr>
+              <a:t>Estonia merged their Border Guard Service with the National Police in 2010, and are no longer classed as a paramilitary force by SIPRI. This accounts for much of the decrease in Estonian military spending in 2010.</a:t>
+            </a:r>
+            <a:r>
+              <a:rPr lang="en-US" dirty="0"/>
+              <a:t> </a:t>
+            </a:r>
+          </a:p>
+          <a:p>
+            <a:endParaRPr lang="en-US" dirty="0"/>
+          </a:p>
+          <a:p>
+            <a:r>
+              <a:rPr lang="en-US" sz="1200" b="1" i="0" u="none" strike="noStrike" kern="1200" dirty="0">
+                <a:solidFill>
+                  <a:schemeClr val="tx1"/>
+                </a:solidFill>
+                <a:effectLst/>
+                <a:latin typeface="+mn-lt"/>
+                <a:ea typeface="+mn-ea"/>
+                <a:cs typeface="+mn-cs"/>
+              </a:rPr>
+              <a:t>Ghana:</a:t>
+            </a:r>
+            <a:r>
+              <a:rPr lang="en-US" sz="1200" b="0" i="0" u="none" strike="noStrike" kern="1200" dirty="0">
+                <a:solidFill>
+                  <a:schemeClr val="tx1"/>
+                </a:solidFill>
+                <a:effectLst/>
+                <a:latin typeface="+mn-lt"/>
+                <a:ea typeface="+mn-ea"/>
+                <a:cs typeface="+mn-cs"/>
+              </a:rPr>
+              <a:t> Ghana has had multiple changes of financial year. Up to and including 1966, the financial year is from January to December. From 1967-68 to 1969-70, the financial year is from July to June. From 1970 to 1979, the financial year is from January-December. (Thus the financial years beginning 1969 and 1970 overlap). Then there are financial years from July 1980 to June 1981, and from July 1981 to June 1982. Finally from 1982 onwards the financial year is from January to December. </a:t>
+            </a:r>
+          </a:p>
+          <a:p>
+            <a:endParaRPr lang="en-US" sz="1200" b="0" i="0" u="none" strike="noStrike" kern="1200" dirty="0">
+              <a:solidFill>
+                <a:schemeClr val="tx1"/>
+              </a:solidFill>
+              <a:effectLst/>
+              <a:latin typeface="+mn-lt"/>
+              <a:ea typeface="+mn-ea"/>
+              <a:cs typeface="+mn-cs"/>
+            </a:endParaRPr>
+          </a:p>
+          <a:p>
+            <a:r>
+              <a:rPr lang="en-US" sz="1200" b="1" i="0" u="none" strike="noStrike" kern="1200" dirty="0">
+                <a:solidFill>
+                  <a:schemeClr val="tx1"/>
+                </a:solidFill>
+                <a:effectLst/>
+                <a:latin typeface="+mn-lt"/>
+                <a:ea typeface="+mn-ea"/>
+                <a:cs typeface="+mn-cs"/>
+              </a:rPr>
+              <a:t>Latvia:</a:t>
+            </a:r>
+            <a:r>
+              <a:rPr lang="en-US" sz="1200" b="0" i="0" u="none" strike="noStrike" kern="1200" dirty="0">
+                <a:solidFill>
+                  <a:schemeClr val="tx1"/>
+                </a:solidFill>
+                <a:effectLst/>
+                <a:latin typeface="+mn-lt"/>
+                <a:ea typeface="+mn-ea"/>
+                <a:cs typeface="+mn-cs"/>
+              </a:rPr>
+              <a:t> Latvia adopted the Euro on the 1st January 2014, at a transition rate of €1 = 0.702804 </a:t>
+            </a:r>
+            <a:r>
+              <a:rPr lang="en-US" sz="1200" b="0" i="0" u="none" strike="noStrike" kern="1200" dirty="0" err="1">
+                <a:solidFill>
+                  <a:schemeClr val="tx1"/>
+                </a:solidFill>
+                <a:effectLst/>
+                <a:latin typeface="+mn-lt"/>
+                <a:ea typeface="+mn-ea"/>
+                <a:cs typeface="+mn-cs"/>
+              </a:rPr>
+              <a:t>lats</a:t>
+            </a:r>
+            <a:r>
+              <a:rPr lang="en-US" sz="1200" b="0" i="0" u="none" strike="noStrike" kern="1200" dirty="0">
+                <a:solidFill>
+                  <a:schemeClr val="tx1"/>
+                </a:solidFill>
+                <a:effectLst/>
+                <a:latin typeface="+mn-lt"/>
+                <a:ea typeface="+mn-ea"/>
+                <a:cs typeface="+mn-cs"/>
+              </a:rPr>
+              <a:t>. All figures have been converted into Euros using this rate. Figures for Latvia do not include allocations for military pensions paid by Russia, which averaged 27 million </a:t>
+            </a:r>
+            <a:r>
+              <a:rPr lang="en-US" sz="1200" b="0" i="0" u="none" strike="noStrike" kern="1200" dirty="0" err="1">
+                <a:solidFill>
+                  <a:schemeClr val="tx1"/>
+                </a:solidFill>
+                <a:effectLst/>
+                <a:latin typeface="+mn-lt"/>
+                <a:ea typeface="+mn-ea"/>
+                <a:cs typeface="+mn-cs"/>
+              </a:rPr>
+              <a:t>lats</a:t>
+            </a:r>
+            <a:r>
+              <a:rPr lang="en-US" sz="1200" b="0" i="0" u="none" strike="noStrike" kern="1200" dirty="0">
+                <a:solidFill>
+                  <a:schemeClr val="tx1"/>
+                </a:solidFill>
+                <a:effectLst/>
+                <a:latin typeface="+mn-lt"/>
+                <a:ea typeface="+mn-ea"/>
+                <a:cs typeface="+mn-cs"/>
+              </a:rPr>
+              <a:t> per year over 1996-1998.</a:t>
+            </a:r>
+            <a:r>
+              <a:rPr lang="en-US" dirty="0"/>
+              <a:t> </a:t>
+            </a:r>
+          </a:p>
+          <a:p>
+            <a:endParaRPr lang="en-US" dirty="0"/>
+          </a:p>
+          <a:p>
+            <a:r>
+              <a:rPr lang="en-US" sz="1200" b="1" i="0" u="none" strike="noStrike" kern="1200" dirty="0">
+                <a:solidFill>
+                  <a:schemeClr val="tx1"/>
+                </a:solidFill>
+                <a:effectLst/>
+                <a:latin typeface="+mn-lt"/>
+                <a:ea typeface="+mn-ea"/>
+                <a:cs typeface="+mn-cs"/>
+              </a:rPr>
+              <a:t>Sierra Leone: </a:t>
+            </a:r>
+            <a:r>
+              <a:rPr lang="en-US" sz="1200" b="0" i="0" u="none" strike="noStrike" kern="1200" dirty="0">
+                <a:solidFill>
+                  <a:schemeClr val="tx1"/>
+                </a:solidFill>
+                <a:effectLst/>
+                <a:latin typeface="+mn-lt"/>
+                <a:ea typeface="+mn-ea"/>
+                <a:cs typeface="+mn-cs"/>
+              </a:rPr>
+              <a:t>The figures for Sierra Leone in 1998 and 1999 are not available due to the coup </a:t>
+            </a:r>
+            <a:r>
+              <a:rPr lang="en-US" sz="1200" b="0" i="0" u="none" strike="noStrike" kern="1200" dirty="0" err="1">
+                <a:solidFill>
+                  <a:schemeClr val="tx1"/>
+                </a:solidFill>
+                <a:effectLst/>
+                <a:latin typeface="+mn-lt"/>
+                <a:ea typeface="+mn-ea"/>
+                <a:cs typeface="+mn-cs"/>
+              </a:rPr>
+              <a:t>d'etat</a:t>
+            </a:r>
+            <a:r>
+              <a:rPr lang="en-US" sz="1200" b="0" i="0" u="none" strike="noStrike" kern="1200" dirty="0">
+                <a:solidFill>
+                  <a:schemeClr val="tx1"/>
+                </a:solidFill>
+                <a:effectLst/>
+                <a:latin typeface="+mn-lt"/>
+                <a:ea typeface="+mn-ea"/>
+                <a:cs typeface="+mn-cs"/>
+              </a:rPr>
+              <a:t> and subsequent civil war. It is not clear whether the data before and after these years are based on the same definition.</a:t>
+            </a:r>
+            <a:r>
+              <a:rPr lang="en-US" dirty="0"/>
+              <a:t> </a:t>
+            </a:r>
+          </a:p>
+        </p:txBody>
+      </p:sp>
+      <p:sp>
+        <p:nvSpPr>
+          <p:cNvPr id="4" name="Slide Number Placeholder 3"/>
+          <p:cNvSpPr>
+            <a:spLocks noGrp="1"/>
+          </p:cNvSpPr>
+          <p:nvPr>
+            <p:ph type="sldNum" sz="quarter" idx="5"/>
+          </p:nvPr>
+        </p:nvSpPr>
+        <p:spPr/>
+        <p:txBody>
+          <a:bodyPr/>
+          <a:lstStyle/>
+          <a:p>
+            <a:fld id="{68E58C9F-A835-45F7-A2FB-D97F5C9E2B18}" type="slidenum">
+              <a:rPr lang="en-US" smtClean="0"/>
+              <a:t>6</a:t>
+            </a:fld>
+            <a:endParaRPr lang="en-US"/>
+          </a:p>
+        </p:txBody>
+      </p:sp>
+    </p:spTree>
+    <p:extLst>
+      <p:ext uri="{BB962C8B-B14F-4D97-AF65-F5344CB8AC3E}">
+        <p14:creationId xmlns:p14="http://schemas.microsoft.com/office/powerpoint/2010/main" val="3201321736"/>
+      </p:ext>
+    </p:extLst>
+  </p:cSld>
+  <p:clrMapOvr>
+    <a:masterClrMapping/>
+  </p:clrMapOvr>
+</p:notes>
+</file>
+
+<file path=ppt/notesSlides/notesSlide5.xml><?xml version="1.0" encoding="utf-8"?>
+<p:notes xmlns:a="http://schemas.openxmlformats.org/drawingml/2006/main" xmlns:r="http://schemas.openxmlformats.org/officeDocument/2006/relationships" xmlns:p="http://schemas.openxmlformats.org/presentationml/2006/main">
+  <p:cSld>
+    <p:spTree>
+      <p:nvGrpSpPr>
+        <p:cNvPr id="1" name=""/>
+        <p:cNvGrpSpPr/>
+        <p:nvPr/>
+      </p:nvGrpSpPr>
+      <p:grpSpPr>
+        <a:xfrm>
+          <a:off x="0" y="0"/>
+          <a:ext cx="0" cy="0"/>
+          <a:chOff x="0" y="0"/>
+          <a:chExt cx="0" cy="0"/>
+        </a:xfrm>
+      </p:grpSpPr>
+      <p:sp>
+        <p:nvSpPr>
+          <p:cNvPr id="2" name="Slide Image Placeholder 1"/>
+          <p:cNvSpPr>
+            <a:spLocks noGrp="1" noRot="1" noChangeAspect="1"/>
+          </p:cNvSpPr>
+          <p:nvPr>
+            <p:ph type="sldImg"/>
+          </p:nvPr>
+        </p:nvSpPr>
+        <p:spPr/>
+      </p:sp>
+      <p:sp>
+        <p:nvSpPr>
+          <p:cNvPr id="3" name="Notes Placeholder 2"/>
+          <p:cNvSpPr>
+            <a:spLocks noGrp="1"/>
+          </p:cNvSpPr>
+          <p:nvPr>
+            <p:ph type="body" idx="1"/>
+          </p:nvPr>
+        </p:nvSpPr>
+        <p:spPr/>
+        <p:txBody>
+          <a:bodyPr/>
+          <a:lstStyle/>
+          <a:p>
+            <a:pPr marL="171450" indent="-171450">
+              <a:buFont typeface="Arial" panose="020B0604020202020204" pitchFamily="34" charset="0"/>
+              <a:buChar char="•"/>
+            </a:pPr>
+            <a:r>
+              <a:rPr lang="en-US" dirty="0"/>
+              <a:t>1994 Yemen Civil War</a:t>
+            </a:r>
+          </a:p>
+          <a:p>
+            <a:pPr marL="628650" lvl="1" indent="-171450">
+              <a:buFont typeface="Arial" panose="020B0604020202020204" pitchFamily="34" charset="0"/>
+              <a:buChar char="•"/>
+            </a:pPr>
+            <a:r>
+              <a:rPr lang="en-US" dirty="0"/>
+              <a:t>USA supported Republic of Yemen</a:t>
+            </a:r>
+          </a:p>
+          <a:p>
+            <a:pPr marL="171450" lvl="0" indent="-171450">
+              <a:buFont typeface="Arial" panose="020B0604020202020204" pitchFamily="34" charset="0"/>
+              <a:buChar char="•"/>
+            </a:pPr>
+            <a:r>
+              <a:rPr lang="en-US" dirty="0"/>
+              <a:t>2001 (9/11)</a:t>
+            </a:r>
+          </a:p>
+          <a:p>
+            <a:pPr marL="628650" lvl="1" indent="-171450">
+              <a:buFont typeface="Arial" panose="020B0604020202020204" pitchFamily="34" charset="0"/>
+              <a:buChar char="•"/>
+            </a:pPr>
+            <a:r>
+              <a:rPr lang="en-US" dirty="0"/>
+              <a:t>Al-Qaeda attacks against US</a:t>
+            </a:r>
+          </a:p>
+          <a:p>
+            <a:pPr marL="171450" lvl="0" indent="-171450">
+              <a:buFont typeface="Arial" panose="020B0604020202020204" pitchFamily="34" charset="0"/>
+              <a:buChar char="•"/>
+            </a:pPr>
+            <a:r>
+              <a:rPr lang="en-US" dirty="0"/>
+              <a:t>2003 Iraq War</a:t>
+            </a:r>
+          </a:p>
+          <a:p>
+            <a:pPr marL="628650" lvl="1" indent="-171450">
+              <a:buFont typeface="Arial" panose="020B0604020202020204" pitchFamily="34" charset="0"/>
+              <a:buChar char="•"/>
+            </a:pPr>
+            <a:r>
+              <a:rPr lang="en-US" dirty="0"/>
+              <a:t>Us forces remained in Iraq until 2011</a:t>
+            </a:r>
+          </a:p>
+          <a:p>
+            <a:pPr marL="171450" lvl="0" indent="-171450">
+              <a:buFont typeface="Arial" panose="020B0604020202020204" pitchFamily="34" charset="0"/>
+              <a:buChar char="•"/>
+            </a:pPr>
+            <a:r>
+              <a:rPr lang="en-US" dirty="0"/>
+              <a:t>2014 – Present: Rise of ISUS</a:t>
+            </a:r>
+          </a:p>
+          <a:p>
+            <a:pPr marL="628650" lvl="1" indent="-171450">
+              <a:buFont typeface="Arial" panose="020B0604020202020204" pitchFamily="34" charset="0"/>
+              <a:buChar char="•"/>
+            </a:pPr>
+            <a:r>
+              <a:rPr lang="en-US" dirty="0"/>
+              <a:t>US-led coalition engaged in airstrikes against ISIS in August 2014</a:t>
+            </a:r>
+          </a:p>
+          <a:p>
+            <a:pPr marL="628650" lvl="1" indent="-171450">
+              <a:buFont typeface="Arial" panose="020B0604020202020204" pitchFamily="34" charset="0"/>
+              <a:buChar char="•"/>
+            </a:pPr>
+            <a:r>
+              <a:rPr lang="en-US" dirty="0"/>
+              <a:t>By 2017 ISIS had lost 95% of its territory</a:t>
+            </a:r>
+          </a:p>
+          <a:p>
+            <a:pPr marL="171450" lvl="0" indent="-171450">
+              <a:buFont typeface="Arial" panose="020B0604020202020204" pitchFamily="34" charset="0"/>
+              <a:buChar char="•"/>
+            </a:pPr>
+            <a:r>
+              <a:rPr lang="en-US" dirty="0"/>
+              <a:t>2015 </a:t>
+            </a:r>
+          </a:p>
+          <a:p>
+            <a:pPr marL="628650" lvl="1" indent="-171450">
+              <a:buFont typeface="Arial" panose="020B0604020202020204" pitchFamily="34" charset="0"/>
+              <a:buChar char="•"/>
+            </a:pPr>
+            <a:r>
+              <a:rPr lang="en-US" dirty="0"/>
+              <a:t>Russia becomes involved with Syrian Civil War</a:t>
+            </a:r>
+          </a:p>
+        </p:txBody>
+      </p:sp>
+      <p:sp>
+        <p:nvSpPr>
+          <p:cNvPr id="4" name="Slide Number Placeholder 3"/>
+          <p:cNvSpPr>
+            <a:spLocks noGrp="1"/>
+          </p:cNvSpPr>
+          <p:nvPr>
+            <p:ph type="sldNum" sz="quarter" idx="5"/>
+          </p:nvPr>
+        </p:nvSpPr>
+        <p:spPr/>
+        <p:txBody>
+          <a:bodyPr/>
+          <a:lstStyle/>
+          <a:p>
+            <a:fld id="{68E58C9F-A835-45F7-A2FB-D97F5C9E2B18}" type="slidenum">
+              <a:rPr lang="en-US" smtClean="0"/>
+              <a:t>7</a:t>
+            </a:fld>
+            <a:endParaRPr lang="en-US"/>
+          </a:p>
+        </p:txBody>
+      </p:sp>
+    </p:spTree>
+    <p:extLst>
+      <p:ext uri="{BB962C8B-B14F-4D97-AF65-F5344CB8AC3E}">
+        <p14:creationId xmlns:p14="http://schemas.microsoft.com/office/powerpoint/2010/main" val="4136251256"/>
+      </p:ext>
+    </p:extLst>
+  </p:cSld>
+  <p:clrMapOvr>
+    <a:masterClrMapping/>
+  </p:clrMapOvr>
+</p:notes>
+</file>
+
+<file path=ppt/notesSlides/notesSlide6.xml><?xml version="1.0" encoding="utf-8"?>
+<p:notes xmlns:a="http://schemas.openxmlformats.org/drawingml/2006/main" xmlns:r="http://schemas.openxmlformats.org/officeDocument/2006/relationships" xmlns:p="http://schemas.openxmlformats.org/presentationml/2006/main">
+  <p:cSld>
+    <p:spTree>
+      <p:nvGrpSpPr>
+        <p:cNvPr id="1" name=""/>
+        <p:cNvGrpSpPr/>
+        <p:nvPr/>
+      </p:nvGrpSpPr>
+      <p:grpSpPr>
+        <a:xfrm>
+          <a:off x="0" y="0"/>
+          <a:ext cx="0" cy="0"/>
+          <a:chOff x="0" y="0"/>
+          <a:chExt cx="0" cy="0"/>
+        </a:xfrm>
+      </p:grpSpPr>
+      <p:sp>
+        <p:nvSpPr>
+          <p:cNvPr id="2" name="Slide Image Placeholder 1"/>
+          <p:cNvSpPr>
+            <a:spLocks noGrp="1" noRot="1" noChangeAspect="1"/>
+          </p:cNvSpPr>
+          <p:nvPr>
+            <p:ph type="sldImg"/>
+          </p:nvPr>
+        </p:nvSpPr>
+        <p:spPr/>
+      </p:sp>
+      <p:sp>
+        <p:nvSpPr>
+          <p:cNvPr id="3" name="Notes Placeholder 2"/>
+          <p:cNvSpPr>
+            <a:spLocks noGrp="1"/>
+          </p:cNvSpPr>
+          <p:nvPr>
+            <p:ph type="body" idx="1"/>
+          </p:nvPr>
+        </p:nvSpPr>
+        <p:spPr/>
+        <p:txBody>
+          <a:bodyPr/>
+          <a:lstStyle/>
+          <a:p>
+            <a:r>
+              <a:rPr lang="en-US" sz="1200" b="1" i="0" u="none" strike="noStrike" kern="1200" dirty="0">
+                <a:solidFill>
+                  <a:schemeClr val="tx1"/>
+                </a:solidFill>
+                <a:effectLst/>
+                <a:latin typeface="+mn-lt"/>
+                <a:ea typeface="+mn-ea"/>
+                <a:cs typeface="+mn-cs"/>
+              </a:rPr>
+              <a:t>China: </a:t>
+            </a:r>
+            <a:r>
+              <a:rPr lang="en-US" sz="1200" b="0" i="0" u="none" strike="noStrike" kern="1200" dirty="0">
+                <a:solidFill>
+                  <a:schemeClr val="tx1"/>
+                </a:solidFill>
+                <a:effectLst/>
+                <a:latin typeface="+mn-lt"/>
+                <a:ea typeface="+mn-ea"/>
+                <a:cs typeface="+mn-cs"/>
+              </a:rPr>
+              <a:t>On 1 July 1997 China resumed its exercise of sovereignty over Hong Kong; and on 20 December 1999 China resumed its exercise of sovereignty over Macao. Unless otherwise noted, data for China do not include data for Hong Kong SAR, China; Macao SAR, China; or Taiwan, China. The new base year is 2015.</a:t>
+            </a:r>
+            <a:r>
+              <a:rPr lang="en-US" dirty="0"/>
+              <a:t> </a:t>
+            </a:r>
+          </a:p>
+          <a:p>
+            <a:endParaRPr lang="en-US" dirty="0"/>
+          </a:p>
+          <a:p>
+            <a:r>
+              <a:rPr lang="en-US" sz="1200" b="1" i="0" u="none" strike="noStrike" kern="1200" dirty="0">
+                <a:solidFill>
+                  <a:schemeClr val="tx1"/>
+                </a:solidFill>
+                <a:effectLst/>
+                <a:latin typeface="+mn-lt"/>
+                <a:ea typeface="+mn-ea"/>
+                <a:cs typeface="+mn-cs"/>
+              </a:rPr>
+              <a:t>France: </a:t>
+            </a:r>
+            <a:r>
+              <a:rPr lang="en-US" sz="1200" b="0" i="0" u="none" strike="noStrike" kern="1200" dirty="0">
+                <a:solidFill>
+                  <a:schemeClr val="tx1"/>
+                </a:solidFill>
+                <a:effectLst/>
+                <a:latin typeface="+mn-lt"/>
+                <a:ea typeface="+mn-ea"/>
+                <a:cs typeface="+mn-cs"/>
+              </a:rPr>
+              <a:t>A simple multiplier is used to convert the national currencies of EMU members to euros. The following irrevocable euro conversion rate was adopted by the EU Council on January 1, 1999: 1 euro = 6.55957 French franc. Please note that historical data before 1999 are not actual euros and are not comparable or suitable for aggregation across countries.</a:t>
+            </a:r>
+            <a:r>
+              <a:rPr lang="en-US" dirty="0"/>
+              <a:t> </a:t>
+            </a:r>
+          </a:p>
+          <a:p>
+            <a:endParaRPr lang="en-US" dirty="0"/>
+          </a:p>
+          <a:p>
+            <a:r>
+              <a:rPr lang="en-US" sz="1200" b="1" i="0" u="none" strike="noStrike" kern="1200" dirty="0">
+                <a:solidFill>
+                  <a:schemeClr val="tx1"/>
+                </a:solidFill>
+                <a:effectLst/>
+                <a:latin typeface="+mn-lt"/>
+                <a:ea typeface="+mn-ea"/>
+                <a:cs typeface="+mn-cs"/>
+              </a:rPr>
+              <a:t>India: </a:t>
+            </a:r>
+            <a:r>
+              <a:rPr lang="en-US" sz="1200" b="0" i="0" u="none" strike="noStrike" kern="1200" dirty="0">
+                <a:solidFill>
+                  <a:schemeClr val="tx1"/>
+                </a:solidFill>
+                <a:effectLst/>
+                <a:latin typeface="+mn-lt"/>
+                <a:ea typeface="+mn-ea"/>
+                <a:cs typeface="+mn-cs"/>
+              </a:rPr>
+              <a:t>Fiscal year end: March 31; reporting period for national accounts data: FY. Based on official government statistics; the new base year is 2011/12. India reports using SNA 2008.</a:t>
+            </a:r>
+            <a:r>
+              <a:rPr lang="en-US" dirty="0"/>
+              <a:t> </a:t>
+            </a:r>
+          </a:p>
+          <a:p>
+            <a:endParaRPr lang="en-US" dirty="0"/>
+          </a:p>
+          <a:p>
+            <a:r>
+              <a:rPr lang="en-US" sz="1200" b="1" i="0" u="none" strike="noStrike" kern="1200" dirty="0">
+                <a:solidFill>
+                  <a:schemeClr val="tx1"/>
+                </a:solidFill>
+                <a:effectLst/>
+                <a:latin typeface="+mn-lt"/>
+                <a:ea typeface="+mn-ea"/>
+                <a:cs typeface="+mn-cs"/>
+              </a:rPr>
+              <a:t>Estonia: </a:t>
+            </a:r>
+            <a:r>
+              <a:rPr lang="en-US" sz="1200" b="0" i="0" u="none" strike="noStrike" kern="1200" dirty="0">
+                <a:solidFill>
+                  <a:schemeClr val="tx1"/>
+                </a:solidFill>
+                <a:effectLst/>
+                <a:latin typeface="+mn-lt"/>
+                <a:ea typeface="+mn-ea"/>
+                <a:cs typeface="+mn-cs"/>
+              </a:rPr>
+              <a:t>A simple multiplier is used to convert the national currencies of EMU members to euros. The following irrevocable euro conversion rate entered into force on January 1, 2011: 1 euro = 15.6466 Estonian kroon. Please note that historical data are not actual euros and are not comparable or suitable for aggregation across countries.</a:t>
+            </a:r>
+            <a:r>
+              <a:rPr lang="en-US" dirty="0"/>
+              <a:t> </a:t>
+            </a:r>
+          </a:p>
+          <a:p>
+            <a:endParaRPr lang="en-US" dirty="0"/>
+          </a:p>
+          <a:p>
+            <a:r>
+              <a:rPr lang="en-US" sz="1200" b="1" i="0" u="none" strike="noStrike" kern="1200" dirty="0">
+                <a:solidFill>
+                  <a:schemeClr val="tx1"/>
+                </a:solidFill>
+                <a:effectLst/>
+                <a:latin typeface="+mn-lt"/>
+                <a:ea typeface="+mn-ea"/>
+                <a:cs typeface="+mn-cs"/>
+              </a:rPr>
+              <a:t>Ghana: </a:t>
+            </a:r>
+            <a:r>
+              <a:rPr lang="en-US" sz="1200" b="0" i="0" u="none" strike="noStrike" kern="1200" dirty="0">
+                <a:solidFill>
+                  <a:schemeClr val="tx1"/>
+                </a:solidFill>
+                <a:effectLst/>
+                <a:latin typeface="+mn-lt"/>
+                <a:ea typeface="+mn-ea"/>
+                <a:cs typeface="+mn-cs"/>
+              </a:rPr>
+              <a:t>Base year change from 2006 to 2013 - national data revised.</a:t>
+            </a:r>
+            <a:r>
+              <a:rPr lang="en-US" dirty="0"/>
+              <a:t> </a:t>
+            </a:r>
+          </a:p>
+          <a:p>
+            <a:endParaRPr lang="en-US" dirty="0"/>
+          </a:p>
+          <a:p>
+            <a:r>
+              <a:rPr lang="en-US" sz="1200" b="1" i="0" u="none" strike="noStrike" kern="1200" dirty="0">
+                <a:solidFill>
+                  <a:schemeClr val="tx1"/>
+                </a:solidFill>
+                <a:effectLst/>
+                <a:latin typeface="+mn-lt"/>
+                <a:ea typeface="+mn-ea"/>
+                <a:cs typeface="+mn-cs"/>
+              </a:rPr>
+              <a:t>Ireland: </a:t>
+            </a:r>
+            <a:r>
+              <a:rPr lang="en-US" sz="1200" b="0" i="0" u="none" strike="noStrike" kern="1200" dirty="0">
+                <a:solidFill>
+                  <a:schemeClr val="tx1"/>
+                </a:solidFill>
+                <a:effectLst/>
+                <a:latin typeface="+mn-lt"/>
+                <a:ea typeface="+mn-ea"/>
+                <a:cs typeface="+mn-cs"/>
+              </a:rPr>
+              <a:t>A simple multiplier is used to convert the national currencies of EMU members to euros. The following irrevocable euro conversion rate was adopted by the EU Council on January 1, 1999: 1 euro = 0.787564 Irish pound. Please note that historical data before 1999 are not actual euros and are not comparable or suitable for aggregation across countries.</a:t>
+            </a:r>
+            <a:r>
+              <a:rPr lang="en-US" dirty="0"/>
+              <a:t> </a:t>
+            </a:r>
+          </a:p>
+          <a:p>
+            <a:endParaRPr lang="en-US" b="1" dirty="0"/>
+          </a:p>
+          <a:p>
+            <a:r>
+              <a:rPr lang="en-US" sz="1200" b="1" i="0" u="none" strike="noStrike" kern="1200" dirty="0">
+                <a:solidFill>
+                  <a:schemeClr val="tx1"/>
+                </a:solidFill>
+                <a:effectLst/>
+                <a:latin typeface="+mn-lt"/>
+                <a:ea typeface="+mn-ea"/>
+                <a:cs typeface="+mn-cs"/>
+              </a:rPr>
+              <a:t>Latvia: </a:t>
+            </a:r>
+            <a:r>
+              <a:rPr lang="en-US" sz="1200" b="0" i="0" u="none" strike="noStrike" kern="1200" dirty="0">
+                <a:solidFill>
+                  <a:schemeClr val="tx1"/>
+                </a:solidFill>
+                <a:effectLst/>
+                <a:latin typeface="+mn-lt"/>
+                <a:ea typeface="+mn-ea"/>
+                <a:cs typeface="+mn-cs"/>
+              </a:rPr>
+              <a:t>A simple multiplier is used to convert the national currencies of EMU members to euros. The following irrevocable euro conversion rate entered into force on January 1, 2014: 1 euro = 0.702804 Latvian </a:t>
+            </a:r>
+            <a:r>
+              <a:rPr lang="en-US" sz="1200" b="0" i="0" u="none" strike="noStrike" kern="1200" dirty="0" err="1">
+                <a:solidFill>
+                  <a:schemeClr val="tx1"/>
+                </a:solidFill>
+                <a:effectLst/>
+                <a:latin typeface="+mn-lt"/>
+                <a:ea typeface="+mn-ea"/>
+                <a:cs typeface="+mn-cs"/>
+              </a:rPr>
+              <a:t>lats</a:t>
+            </a:r>
+            <a:r>
+              <a:rPr lang="en-US" sz="1200" b="0" i="0" u="none" strike="noStrike" kern="1200" dirty="0">
+                <a:solidFill>
+                  <a:schemeClr val="tx1"/>
+                </a:solidFill>
+                <a:effectLst/>
+                <a:latin typeface="+mn-lt"/>
+                <a:ea typeface="+mn-ea"/>
+                <a:cs typeface="+mn-cs"/>
+              </a:rPr>
+              <a:t>. Please note that historical data are not actual euros and are not comparable or suitable for aggregation across countries. Based on data from EUROSTAT, the new reference year is 2010.</a:t>
+            </a:r>
+            <a:r>
+              <a:rPr lang="en-US" dirty="0"/>
+              <a:t> </a:t>
+            </a:r>
+          </a:p>
+          <a:p>
+            <a:endParaRPr lang="en-US" dirty="0"/>
+          </a:p>
+          <a:p>
+            <a:r>
+              <a:rPr lang="en-US" sz="1200" b="1" i="0" u="none" strike="noStrike" kern="1200" dirty="0">
+                <a:solidFill>
+                  <a:schemeClr val="tx1"/>
+                </a:solidFill>
+                <a:effectLst/>
+                <a:latin typeface="+mn-lt"/>
+                <a:ea typeface="+mn-ea"/>
+                <a:cs typeface="+mn-cs"/>
+              </a:rPr>
+              <a:t>Sierra Leone: </a:t>
+            </a:r>
+            <a:r>
+              <a:rPr lang="en-US" sz="1200" b="0" i="0" u="none" strike="noStrike" kern="1200" dirty="0">
+                <a:solidFill>
+                  <a:schemeClr val="tx1"/>
+                </a:solidFill>
+                <a:effectLst/>
+                <a:latin typeface="+mn-lt"/>
+                <a:ea typeface="+mn-ea"/>
+                <a:cs typeface="+mn-cs"/>
+              </a:rPr>
+              <a:t>Fiscal year end: June 30; reporting period for national accounts data: CY.</a:t>
+            </a:r>
+            <a:r>
+              <a:rPr lang="en-US" dirty="0"/>
+              <a:t> </a:t>
+            </a:r>
+          </a:p>
+        </p:txBody>
+      </p:sp>
+      <p:sp>
+        <p:nvSpPr>
+          <p:cNvPr id="4" name="Slide Number Placeholder 3"/>
+          <p:cNvSpPr>
+            <a:spLocks noGrp="1"/>
+          </p:cNvSpPr>
+          <p:nvPr>
+            <p:ph type="sldNum" sz="quarter" idx="5"/>
+          </p:nvPr>
+        </p:nvSpPr>
+        <p:spPr/>
+        <p:txBody>
+          <a:bodyPr/>
+          <a:lstStyle/>
+          <a:p>
+            <a:fld id="{68E58C9F-A835-45F7-A2FB-D97F5C9E2B18}" type="slidenum">
+              <a:rPr lang="en-US" smtClean="0"/>
+              <a:t>11</a:t>
+            </a:fld>
+            <a:endParaRPr lang="en-US"/>
+          </a:p>
+        </p:txBody>
+      </p:sp>
+    </p:spTree>
+    <p:extLst>
+      <p:ext uri="{BB962C8B-B14F-4D97-AF65-F5344CB8AC3E}">
+        <p14:creationId xmlns:p14="http://schemas.microsoft.com/office/powerpoint/2010/main" val="3008882791"/>
+      </p:ext>
+    </p:extLst>
+  </p:cSld>
+  <p:clrMapOvr>
+    <a:masterClrMapping/>
+  </p:clrMapOvr>
+</p:notes>
+</file>
+
+<file path=ppt/notesSlides/notesSlide7.xml><?xml version="1.0" encoding="utf-8"?>
+<p:notes xmlns:a="http://schemas.openxmlformats.org/drawingml/2006/main" xmlns:r="http://schemas.openxmlformats.org/officeDocument/2006/relationships" xmlns:p="http://schemas.openxmlformats.org/presentationml/2006/main">
+  <p:cSld>
+    <p:spTree>
+      <p:nvGrpSpPr>
+        <p:cNvPr id="1" name=""/>
+        <p:cNvGrpSpPr/>
+        <p:nvPr/>
+      </p:nvGrpSpPr>
+      <p:grpSpPr>
+        <a:xfrm>
+          <a:off x="0" y="0"/>
+          <a:ext cx="0" cy="0"/>
+          <a:chOff x="0" y="0"/>
+          <a:chExt cx="0" cy="0"/>
+        </a:xfrm>
+      </p:grpSpPr>
+      <p:sp>
+        <p:nvSpPr>
+          <p:cNvPr id="2" name="Slide Image Placeholder 1"/>
+          <p:cNvSpPr>
+            <a:spLocks noGrp="1" noRot="1" noChangeAspect="1"/>
+          </p:cNvSpPr>
+          <p:nvPr>
+            <p:ph type="sldImg"/>
+          </p:nvPr>
+        </p:nvSpPr>
+        <p:spPr/>
+      </p:sp>
+      <p:sp>
+        <p:nvSpPr>
+          <p:cNvPr id="3" name="Notes Placeholder 2"/>
+          <p:cNvSpPr>
+            <a:spLocks noGrp="1"/>
+          </p:cNvSpPr>
+          <p:nvPr>
+            <p:ph type="body" idx="1"/>
+          </p:nvPr>
+        </p:nvSpPr>
+        <p:spPr/>
+        <p:txBody>
+          <a:bodyPr/>
+          <a:lstStyle/>
+          <a:p>
+            <a:r>
+              <a:rPr lang="en-US" sz="1200" b="1" i="0" u="none" strike="noStrike" kern="1200" dirty="0">
+                <a:solidFill>
+                  <a:schemeClr val="tx1"/>
+                </a:solidFill>
+                <a:effectLst/>
+                <a:latin typeface="+mn-lt"/>
+                <a:ea typeface="+mn-ea"/>
+                <a:cs typeface="+mn-cs"/>
+              </a:rPr>
+              <a:t>China: </a:t>
+            </a:r>
+            <a:r>
+              <a:rPr lang="en-US" sz="1200" b="0" i="0" u="none" strike="noStrike" kern="1200" dirty="0">
+                <a:solidFill>
+                  <a:schemeClr val="tx1"/>
+                </a:solidFill>
+                <a:effectLst/>
+                <a:latin typeface="+mn-lt"/>
+                <a:ea typeface="+mn-ea"/>
+                <a:cs typeface="+mn-cs"/>
+              </a:rPr>
+              <a:t>NBS - National Bureau of Statistics and Bank's country office ; Source of population estimates: National Bureau of Statistics. On 1 July 1997 China resumed its exercise of sovereignty over Hong Kong; and on 20 December 1999 China resumed its exercise of sovereignty over Macao. Unless otherwise noted, data for China do not include data for Hong Kong SAR, China; Macao SAR, China; or Taiwan, China. The new base year is 2015.</a:t>
+            </a:r>
+            <a:r>
+              <a:rPr lang="en-US" dirty="0"/>
+              <a:t> </a:t>
+            </a:r>
+          </a:p>
+          <a:p>
+            <a:endParaRPr lang="en-US" dirty="0"/>
+          </a:p>
+          <a:p>
+            <a:r>
+              <a:rPr lang="en-US" sz="1200" b="1" i="0" u="none" strike="noStrike" kern="1200" dirty="0">
+                <a:solidFill>
+                  <a:schemeClr val="tx1"/>
+                </a:solidFill>
+                <a:effectLst/>
+                <a:latin typeface="+mn-lt"/>
+                <a:ea typeface="+mn-ea"/>
+                <a:cs typeface="+mn-cs"/>
+              </a:rPr>
+              <a:t>France: </a:t>
+            </a:r>
+            <a:r>
+              <a:rPr lang="en-US" sz="1200" b="0" i="0" u="none" strike="noStrike" kern="1200" dirty="0">
+                <a:solidFill>
+                  <a:schemeClr val="tx1"/>
+                </a:solidFill>
+                <a:effectLst/>
+                <a:latin typeface="+mn-lt"/>
+                <a:ea typeface="+mn-ea"/>
+                <a:cs typeface="+mn-cs"/>
+              </a:rPr>
+              <a:t>OECD (Organization for Economic Cooperation and Development) ; Source of population estimates: Eurostat, United Nations World Population Prospects. Including the French overseas departments of French Guiana, Guadeloupe, Martinique, Réunion, as well as Mayotte. A simple multiplier is used to convert the national currencies of EMU members to euros. The following irrevocable euro conversion rate was adopted by the EU Council on January 1, 1999: 1 euro = 6.55957 French franc. Please note that historical data before 1999 are not actual euros and are not comparable or suitable for aggregation across countries.</a:t>
+            </a:r>
+            <a:r>
+              <a:rPr lang="en-US" dirty="0"/>
+              <a:t> </a:t>
+            </a:r>
+          </a:p>
+          <a:p>
+            <a:endParaRPr lang="en-US" dirty="0"/>
+          </a:p>
+          <a:p>
+            <a:r>
+              <a:rPr lang="en-US" sz="1200" b="1" i="0" u="none" strike="noStrike" kern="1200" dirty="0">
+                <a:solidFill>
+                  <a:schemeClr val="tx1"/>
+                </a:solidFill>
+                <a:effectLst/>
+                <a:latin typeface="+mn-lt"/>
+                <a:ea typeface="+mn-ea"/>
+                <a:cs typeface="+mn-cs"/>
+              </a:rPr>
+              <a:t>India: </a:t>
+            </a:r>
+            <a:r>
+              <a:rPr lang="en-US" sz="1200" b="0" i="0" u="none" strike="noStrike" kern="1200" dirty="0">
+                <a:solidFill>
+                  <a:schemeClr val="tx1"/>
+                </a:solidFill>
+                <a:effectLst/>
+                <a:latin typeface="+mn-lt"/>
+                <a:ea typeface="+mn-ea"/>
+                <a:cs typeface="+mn-cs"/>
+              </a:rPr>
+              <a:t>Central Statistics Office ; Source of population estimates: UN Population Division's World Population Prospects 2019 PROVISIONAL estimates. Not for circulation. Subject to change. Fiscal year end: March 31; reporting period for national accounts data: FY. Based on official government statistics; the new base year is 2011/12. India reports using SNA 2008.</a:t>
+            </a:r>
+            <a:r>
+              <a:rPr lang="en-US" dirty="0"/>
+              <a:t> </a:t>
+            </a:r>
+          </a:p>
+          <a:p>
+            <a:endParaRPr lang="en-US" dirty="0"/>
+          </a:p>
+          <a:p>
+            <a:r>
+              <a:rPr lang="en-US" sz="1200" b="1" i="0" u="none" strike="noStrike" kern="1200" dirty="0">
+                <a:solidFill>
+                  <a:schemeClr val="tx1"/>
+                </a:solidFill>
+                <a:effectLst/>
+                <a:latin typeface="+mn-lt"/>
+                <a:ea typeface="+mn-ea"/>
+                <a:cs typeface="+mn-cs"/>
+              </a:rPr>
+              <a:t>Russia: </a:t>
+            </a:r>
+            <a:r>
+              <a:rPr lang="en-US" sz="1200" b="0" i="0" u="none" strike="noStrike" kern="1200" dirty="0" err="1">
+                <a:solidFill>
+                  <a:schemeClr val="tx1"/>
+                </a:solidFill>
+                <a:effectLst/>
+                <a:latin typeface="+mn-lt"/>
+                <a:ea typeface="+mn-ea"/>
+                <a:cs typeface="+mn-cs"/>
+              </a:rPr>
+              <a:t>Rosstat</a:t>
+            </a:r>
+            <a:r>
+              <a:rPr lang="en-US" sz="1200" b="0" i="0" u="none" strike="noStrike" kern="1200" dirty="0">
+                <a:solidFill>
+                  <a:schemeClr val="tx1"/>
+                </a:solidFill>
+                <a:effectLst/>
+                <a:latin typeface="+mn-lt"/>
+                <a:ea typeface="+mn-ea"/>
+                <a:cs typeface="+mn-cs"/>
+              </a:rPr>
+              <a:t> ; Source of population estimates: Russian Federation Federal State Statistics Service (its January 1st populations were adjusted to mid-year populations by using geometric mean), 1979 Census, 1989 Census.</a:t>
+            </a:r>
+            <a:r>
+              <a:rPr lang="en-US" dirty="0"/>
+              <a:t> </a:t>
+            </a:r>
+          </a:p>
+          <a:p>
+            <a:endParaRPr lang="en-US" dirty="0"/>
+          </a:p>
+          <a:p>
+            <a:r>
+              <a:rPr lang="en-US" sz="1200" b="1" i="0" u="none" strike="noStrike" kern="1200" dirty="0">
+                <a:solidFill>
+                  <a:schemeClr val="tx1"/>
+                </a:solidFill>
+                <a:effectLst/>
+                <a:latin typeface="+mn-lt"/>
+                <a:ea typeface="+mn-ea"/>
+                <a:cs typeface="+mn-cs"/>
+              </a:rPr>
+              <a:t>USA:</a:t>
+            </a:r>
+            <a:r>
+              <a:rPr lang="en-US" sz="1200" b="0" i="0" u="none" strike="noStrike" kern="1200" dirty="0">
+                <a:solidFill>
+                  <a:schemeClr val="tx1"/>
+                </a:solidFill>
+                <a:effectLst/>
+                <a:latin typeface="+mn-lt"/>
+                <a:ea typeface="+mn-ea"/>
+                <a:cs typeface="+mn-cs"/>
+              </a:rPr>
+              <a:t> OECD (Organization for Economic Cooperation and Development) ; Source of population estimates: U.S. Census Bureau</a:t>
+            </a:r>
+            <a:r>
+              <a:rPr lang="en-US" dirty="0"/>
+              <a:t> </a:t>
+            </a:r>
+          </a:p>
+          <a:p>
+            <a:endParaRPr lang="en-US" dirty="0"/>
+          </a:p>
+          <a:p>
+            <a:r>
+              <a:rPr lang="en-US" sz="1200" b="1" i="0" u="none" strike="noStrike" kern="1200" dirty="0">
+                <a:solidFill>
+                  <a:schemeClr val="tx1"/>
+                </a:solidFill>
+                <a:effectLst/>
+                <a:latin typeface="+mn-lt"/>
+                <a:ea typeface="+mn-ea"/>
+                <a:cs typeface="+mn-cs"/>
+              </a:rPr>
+              <a:t>Estonia: </a:t>
+            </a:r>
+            <a:r>
+              <a:rPr lang="en-US" sz="1200" b="0" i="0" u="none" strike="noStrike" kern="1200" dirty="0">
+                <a:solidFill>
+                  <a:schemeClr val="tx1"/>
+                </a:solidFill>
+                <a:effectLst/>
+                <a:latin typeface="+mn-lt"/>
+                <a:ea typeface="+mn-ea"/>
+                <a:cs typeface="+mn-cs"/>
+              </a:rPr>
+              <a:t>OECD (Organization for Economic Cooperation and Development) ; Source of population estimates: Eurostat. A simple multiplier is used to convert the national currencies of EMU members to euros. The following irrevocable euro conversion rate entered into force on January 1, 2011: 1 euro = 15.6466 Estonian kroon. Please note that historical data are not actual euros and are not comparable or suitable for aggregation across countries.</a:t>
+            </a:r>
+            <a:r>
+              <a:rPr lang="en-US" dirty="0"/>
+              <a:t> </a:t>
+            </a:r>
+          </a:p>
+          <a:p>
+            <a:endParaRPr lang="en-US" dirty="0"/>
+          </a:p>
+          <a:p>
+            <a:r>
+              <a:rPr lang="en-US" sz="1200" b="1" i="0" u="none" strike="noStrike" kern="1200" dirty="0">
+                <a:solidFill>
+                  <a:schemeClr val="tx1"/>
+                </a:solidFill>
+                <a:effectLst/>
+                <a:latin typeface="+mn-lt"/>
+                <a:ea typeface="+mn-ea"/>
+                <a:cs typeface="+mn-cs"/>
+              </a:rPr>
+              <a:t>Ghana: </a:t>
+            </a:r>
+            <a:r>
+              <a:rPr lang="en-US" sz="1200" b="0" i="0" u="none" strike="noStrike" kern="1200" dirty="0">
+                <a:solidFill>
+                  <a:schemeClr val="tx1"/>
+                </a:solidFill>
+                <a:effectLst/>
+                <a:latin typeface="+mn-lt"/>
+                <a:ea typeface="+mn-ea"/>
+                <a:cs typeface="+mn-cs"/>
+              </a:rPr>
+              <a:t>Bureau of Statistics ; Source of population estimates: UN Population Division's World Population Prospects 2019 PROVISIONAL estimates. Not for circulation. Subject to change.</a:t>
+            </a:r>
+            <a:r>
+              <a:rPr lang="en-US" dirty="0"/>
+              <a:t> </a:t>
+            </a:r>
+          </a:p>
+          <a:p>
+            <a:endParaRPr lang="en-US" dirty="0"/>
+          </a:p>
+          <a:p>
+            <a:r>
+              <a:rPr lang="en-US" sz="1200" b="1" i="0" u="none" strike="noStrike" kern="1200" dirty="0">
+                <a:solidFill>
+                  <a:schemeClr val="tx1"/>
+                </a:solidFill>
+                <a:effectLst/>
+                <a:latin typeface="+mn-lt"/>
+                <a:ea typeface="+mn-ea"/>
+                <a:cs typeface="+mn-cs"/>
+              </a:rPr>
+              <a:t>Ireland: </a:t>
+            </a:r>
+            <a:r>
+              <a:rPr lang="en-US" sz="1200" b="0" i="0" u="none" strike="noStrike" kern="1200" dirty="0">
+                <a:solidFill>
+                  <a:schemeClr val="tx1"/>
+                </a:solidFill>
+                <a:effectLst/>
+                <a:latin typeface="+mn-lt"/>
+                <a:ea typeface="+mn-ea"/>
+                <a:cs typeface="+mn-cs"/>
+              </a:rPr>
+              <a:t>OECD (Organization for Economic Cooperation and Development) ; Source of population estimates: Eurostat. A simple multiplier is used to convert the national currencies of EMU members to euros. The following irrevocable euro conversion rate was adopted by the EU Council on January 1, 1999: 1 euro = 0.787564 Irish pound. Please note that historical data before 1999 are not actual euros and are not comparable or suitable for aggregation across countries.</a:t>
+            </a:r>
+            <a:r>
+              <a:rPr lang="en-US" dirty="0"/>
+              <a:t> </a:t>
+            </a:r>
+          </a:p>
+          <a:p>
+            <a:endParaRPr lang="en-US" dirty="0"/>
+          </a:p>
+          <a:p>
+            <a:r>
+              <a:rPr lang="en-US" sz="1200" b="1" i="0" u="none" strike="noStrike" kern="1200" dirty="0">
+                <a:solidFill>
+                  <a:schemeClr val="tx1"/>
+                </a:solidFill>
+                <a:effectLst/>
+                <a:latin typeface="+mn-lt"/>
+                <a:ea typeface="+mn-ea"/>
+                <a:cs typeface="+mn-cs"/>
+              </a:rPr>
+              <a:t>Latvia: </a:t>
+            </a:r>
+            <a:r>
+              <a:rPr lang="en-US" sz="1200" b="0" i="0" u="none" strike="noStrike" kern="1200" dirty="0">
+                <a:solidFill>
+                  <a:schemeClr val="tx1"/>
+                </a:solidFill>
+                <a:effectLst/>
+                <a:latin typeface="+mn-lt"/>
+                <a:ea typeface="+mn-ea"/>
+                <a:cs typeface="+mn-cs"/>
+              </a:rPr>
+              <a:t>OECD (Organization for Economic Cooperation and Development) ; Source of population estimates: Eurostat. A simple multiplier is used to convert the national currencies of EMU members to euros. The following irrevocable euro conversion rate entered into force on January 1, 2014: 1 euro = 0.702804 Latvian </a:t>
+            </a:r>
+            <a:r>
+              <a:rPr lang="en-US" sz="1200" b="0" i="0" u="none" strike="noStrike" kern="1200" dirty="0" err="1">
+                <a:solidFill>
+                  <a:schemeClr val="tx1"/>
+                </a:solidFill>
+                <a:effectLst/>
+                <a:latin typeface="+mn-lt"/>
+                <a:ea typeface="+mn-ea"/>
+                <a:cs typeface="+mn-cs"/>
+              </a:rPr>
+              <a:t>lats</a:t>
+            </a:r>
+            <a:r>
+              <a:rPr lang="en-US" sz="1200" b="0" i="0" u="none" strike="noStrike" kern="1200" dirty="0">
+                <a:solidFill>
+                  <a:schemeClr val="tx1"/>
+                </a:solidFill>
+                <a:effectLst/>
+                <a:latin typeface="+mn-lt"/>
+                <a:ea typeface="+mn-ea"/>
+                <a:cs typeface="+mn-cs"/>
+              </a:rPr>
+              <a:t>. Please note that historical data are not actual euros and are not comparable or suitable for aggregation across countries. Based on data from EUROSTAT, the new reference year is 2010.</a:t>
+            </a:r>
+            <a:r>
+              <a:rPr lang="en-US" dirty="0"/>
+              <a:t> </a:t>
+            </a:r>
+          </a:p>
+          <a:p>
+            <a:endParaRPr lang="en-US" b="1" dirty="0"/>
+          </a:p>
+          <a:p>
+            <a:r>
+              <a:rPr lang="en-US" sz="1200" b="1" i="0" u="none" strike="noStrike" kern="1200" dirty="0">
+                <a:solidFill>
+                  <a:schemeClr val="tx1"/>
+                </a:solidFill>
+                <a:effectLst/>
+                <a:latin typeface="+mn-lt"/>
+                <a:ea typeface="+mn-ea"/>
+                <a:cs typeface="+mn-cs"/>
+              </a:rPr>
+              <a:t>Sierra Leone: </a:t>
+            </a:r>
+            <a:r>
+              <a:rPr lang="en-US" sz="1200" b="0" i="0" u="none" strike="noStrike" kern="1200" dirty="0">
+                <a:solidFill>
+                  <a:schemeClr val="tx1"/>
+                </a:solidFill>
+                <a:effectLst/>
+                <a:latin typeface="+mn-lt"/>
+                <a:ea typeface="+mn-ea"/>
+                <a:cs typeface="+mn-cs"/>
+              </a:rPr>
+              <a:t>Statistics Sierra Leone, IMF Article IV ; Source of population estimates: UN Population Division's World Population Prospects 2019 PROVISIONAL estimates. Not for circulation. Subject to change. Fiscal year end: June 30; reporting period for national accounts data: CY.</a:t>
+            </a:r>
+            <a:r>
+              <a:rPr lang="en-US" dirty="0"/>
+              <a:t> </a:t>
+            </a:r>
+          </a:p>
+        </p:txBody>
+      </p:sp>
+      <p:sp>
+        <p:nvSpPr>
+          <p:cNvPr id="4" name="Slide Number Placeholder 3"/>
+          <p:cNvSpPr>
+            <a:spLocks noGrp="1"/>
+          </p:cNvSpPr>
+          <p:nvPr>
+            <p:ph type="sldNum" sz="quarter" idx="5"/>
+          </p:nvPr>
+        </p:nvSpPr>
+        <p:spPr/>
+        <p:txBody>
+          <a:bodyPr/>
+          <a:lstStyle/>
+          <a:p>
+            <a:fld id="{68E58C9F-A835-45F7-A2FB-D97F5C9E2B18}" type="slidenum">
+              <a:rPr lang="en-US" smtClean="0"/>
+              <a:t>12</a:t>
+            </a:fld>
+            <a:endParaRPr lang="en-US"/>
+          </a:p>
+        </p:txBody>
+      </p:sp>
+    </p:spTree>
+    <p:extLst>
+      <p:ext uri="{BB962C8B-B14F-4D97-AF65-F5344CB8AC3E}">
+        <p14:creationId xmlns:p14="http://schemas.microsoft.com/office/powerpoint/2010/main" val="3231845119"/>
+      </p:ext>
+    </p:extLst>
+  </p:cSld>
+  <p:clrMapOvr>
+    <a:masterClrMapping/>
+  </p:clrMapOvr>
+</p:notes>
+</file>
+
+<file path=ppt/notesSlides/notesSlide8.xml><?xml version="1.0" encoding="utf-8"?>
+<p:notes xmlns:a="http://schemas.openxmlformats.org/drawingml/2006/main" xmlns:r="http://schemas.openxmlformats.org/officeDocument/2006/relationships" xmlns:p="http://schemas.openxmlformats.org/presentationml/2006/main">
+  <p:cSld>
+    <p:spTree>
+      <p:nvGrpSpPr>
+        <p:cNvPr id="1" name=""/>
+        <p:cNvGrpSpPr/>
+        <p:nvPr/>
+      </p:nvGrpSpPr>
+      <p:grpSpPr>
+        <a:xfrm>
+          <a:off x="0" y="0"/>
+          <a:ext cx="0" cy="0"/>
+          <a:chOff x="0" y="0"/>
+          <a:chExt cx="0" cy="0"/>
+        </a:xfrm>
+      </p:grpSpPr>
+      <p:sp>
+        <p:nvSpPr>
+          <p:cNvPr id="2" name="Slide Image Placeholder 1"/>
+          <p:cNvSpPr>
+            <a:spLocks noGrp="1" noRot="1" noChangeAspect="1"/>
+          </p:cNvSpPr>
+          <p:nvPr>
+            <p:ph type="sldImg"/>
+          </p:nvPr>
+        </p:nvSpPr>
+        <p:spPr/>
+      </p:sp>
+      <p:sp>
+        <p:nvSpPr>
+          <p:cNvPr id="3" name="Notes Placeholder 2"/>
+          <p:cNvSpPr>
+            <a:spLocks noGrp="1"/>
+          </p:cNvSpPr>
+          <p:nvPr>
+            <p:ph type="body" idx="1"/>
+          </p:nvPr>
+        </p:nvSpPr>
+        <p:spPr/>
+        <p:txBody>
+          <a:bodyPr/>
+          <a:lstStyle/>
+          <a:p>
+            <a:r>
+              <a:rPr lang="en-US" sz="1200" u="sng" kern="1200" dirty="0">
+                <a:solidFill>
+                  <a:schemeClr val="tx1"/>
+                </a:solidFill>
+                <a:effectLst/>
+                <a:latin typeface="+mn-lt"/>
+                <a:ea typeface="+mn-ea"/>
+                <a:cs typeface="+mn-cs"/>
+              </a:rPr>
+              <a:t>Mexican Dirty War (1964-1982)</a:t>
+            </a:r>
+            <a:endParaRPr lang="en-US" sz="1200" kern="1200" dirty="0">
+              <a:solidFill>
+                <a:schemeClr val="tx1"/>
+              </a:solidFill>
+              <a:effectLst/>
+              <a:latin typeface="+mn-lt"/>
+              <a:ea typeface="+mn-ea"/>
+              <a:cs typeface="+mn-cs"/>
+            </a:endParaRPr>
+          </a:p>
+          <a:p>
+            <a:r>
+              <a:rPr lang="en-US" sz="1200" kern="1200" dirty="0">
+                <a:solidFill>
+                  <a:schemeClr val="tx1"/>
+                </a:solidFill>
+                <a:effectLst/>
+                <a:latin typeface="+mn-lt"/>
+                <a:ea typeface="+mn-ea"/>
+                <a:cs typeface="+mn-cs"/>
+              </a:rPr>
+              <a:t>Location: Mexico</a:t>
+            </a:r>
+          </a:p>
+          <a:p>
+            <a:r>
+              <a:rPr lang="en-US" sz="1200" kern="1200" dirty="0">
+                <a:solidFill>
+                  <a:schemeClr val="tx1"/>
+                </a:solidFill>
+                <a:effectLst/>
+                <a:latin typeface="+mn-lt"/>
+                <a:ea typeface="+mn-ea"/>
+                <a:cs typeface="+mn-cs"/>
+              </a:rPr>
+              <a:t>An internal conflict between the PRI-led gov’t (Institutional Revolutionary Party) and guerilla/left-wing student groups in the 60s/70s. Gov’t forces carried out around 1200 disappearances, systematic torture and ‘probable extrajudicial executions.’ In 78, left-wing political parties were legalized as well as imprisoned and at large guerillas caused to end militant struggle against the gov’t. It has been said that some groups continued the hostilities until 1982.</a:t>
+            </a:r>
+          </a:p>
+          <a:p>
+            <a:r>
+              <a:rPr lang="en-US" sz="1200" kern="1200" dirty="0">
+                <a:solidFill>
+                  <a:schemeClr val="tx1"/>
+                </a:solidFill>
+                <a:effectLst/>
+                <a:latin typeface="+mn-lt"/>
+                <a:ea typeface="+mn-ea"/>
+                <a:cs typeface="+mn-cs"/>
+              </a:rPr>
+              <a:t>Parties involved:</a:t>
+            </a:r>
+          </a:p>
+          <a:p>
+            <a:pPr lvl="0"/>
+            <a:r>
+              <a:rPr lang="en-US" sz="1200" kern="1200" dirty="0">
+                <a:solidFill>
+                  <a:schemeClr val="tx1"/>
+                </a:solidFill>
+                <a:effectLst/>
+                <a:latin typeface="+mn-lt"/>
+                <a:ea typeface="+mn-ea"/>
+                <a:cs typeface="+mn-cs"/>
+              </a:rPr>
+              <a:t>Left-wing groups</a:t>
+            </a:r>
+          </a:p>
+          <a:p>
+            <a:pPr lvl="0"/>
+            <a:r>
+              <a:rPr lang="en-US" sz="1200" kern="1200" dirty="0">
+                <a:solidFill>
+                  <a:schemeClr val="tx1"/>
+                </a:solidFill>
+                <a:effectLst/>
+                <a:latin typeface="+mn-lt"/>
+                <a:ea typeface="+mn-ea"/>
+                <a:cs typeface="+mn-cs"/>
+              </a:rPr>
+              <a:t>Mexico</a:t>
+            </a:r>
+          </a:p>
+          <a:p>
+            <a:pPr lvl="1"/>
+            <a:r>
+              <a:rPr lang="en-US" sz="1200" kern="1200" dirty="0">
+                <a:solidFill>
+                  <a:schemeClr val="tx1"/>
+                </a:solidFill>
+                <a:effectLst/>
+                <a:latin typeface="+mn-lt"/>
+                <a:ea typeface="+mn-ea"/>
+                <a:cs typeface="+mn-cs"/>
+              </a:rPr>
+              <a:t>Supported by: USA</a:t>
+            </a:r>
+          </a:p>
+          <a:p>
+            <a:r>
+              <a:rPr lang="en-US" sz="1200" kern="1200" dirty="0">
+                <a:solidFill>
+                  <a:schemeClr val="tx1"/>
+                </a:solidFill>
+                <a:effectLst/>
+                <a:latin typeface="+mn-lt"/>
+                <a:ea typeface="+mn-ea"/>
+                <a:cs typeface="+mn-cs"/>
+              </a:rPr>
+              <a:t> </a:t>
+            </a:r>
+          </a:p>
+          <a:p>
+            <a:r>
+              <a:rPr lang="en-US" sz="1200" u="sng" kern="1200" dirty="0">
+                <a:solidFill>
+                  <a:schemeClr val="tx1"/>
+                </a:solidFill>
+                <a:effectLst/>
+                <a:latin typeface="+mn-lt"/>
+                <a:ea typeface="+mn-ea"/>
+                <a:cs typeface="+mn-cs"/>
+              </a:rPr>
+              <a:t>Zapatista Uprising (Jan1-12, 1994)</a:t>
+            </a:r>
+            <a:endParaRPr lang="en-US" sz="1200" kern="1200" dirty="0">
+              <a:solidFill>
+                <a:schemeClr val="tx1"/>
+              </a:solidFill>
+              <a:effectLst/>
+              <a:latin typeface="+mn-lt"/>
+              <a:ea typeface="+mn-ea"/>
+              <a:cs typeface="+mn-cs"/>
+            </a:endParaRPr>
+          </a:p>
+          <a:p>
+            <a:r>
+              <a:rPr lang="en-US" sz="1200" kern="1200" dirty="0">
+                <a:solidFill>
+                  <a:schemeClr val="tx1"/>
+                </a:solidFill>
+                <a:effectLst/>
+                <a:latin typeface="+mn-lt"/>
+                <a:ea typeface="+mn-ea"/>
+                <a:cs typeface="+mn-cs"/>
+              </a:rPr>
+              <a:t>Location: Chiapas, Mexico</a:t>
+            </a:r>
+          </a:p>
+          <a:p>
+            <a:r>
+              <a:rPr lang="en-US" sz="1200" kern="1200" dirty="0">
+                <a:solidFill>
+                  <a:schemeClr val="tx1"/>
+                </a:solidFill>
+                <a:effectLst/>
+                <a:latin typeface="+mn-lt"/>
+                <a:ea typeface="+mn-ea"/>
+                <a:cs typeface="+mn-cs"/>
+              </a:rPr>
+              <a:t>The Zapatista Army of Nat’l Liberation (EZLN) launched an uprising, which lasted 12 days, in that state of Chiapas to protest the enactment of NAFTA. The Mexican gov’t called a ceasefire on 1/12/94, after the Mexican army had driven rebels into the </a:t>
+            </a:r>
+            <a:r>
+              <a:rPr lang="en-US" sz="1200" kern="1200" dirty="0" err="1">
+                <a:solidFill>
+                  <a:schemeClr val="tx1"/>
+                </a:solidFill>
+                <a:effectLst/>
+                <a:latin typeface="+mn-lt"/>
+                <a:ea typeface="+mn-ea"/>
+                <a:cs typeface="+mn-cs"/>
+              </a:rPr>
+              <a:t>Lancandon</a:t>
+            </a:r>
+            <a:r>
+              <a:rPr lang="en-US" sz="1200" kern="1200" dirty="0">
+                <a:solidFill>
+                  <a:schemeClr val="tx1"/>
+                </a:solidFill>
+                <a:effectLst/>
+                <a:latin typeface="+mn-lt"/>
+                <a:ea typeface="+mn-ea"/>
+                <a:cs typeface="+mn-cs"/>
+              </a:rPr>
+              <a:t> jungle.</a:t>
+            </a:r>
+          </a:p>
+          <a:p>
+            <a:r>
+              <a:rPr lang="en-US" sz="1200" kern="1200" dirty="0">
+                <a:solidFill>
+                  <a:schemeClr val="tx1"/>
+                </a:solidFill>
+                <a:effectLst/>
+                <a:latin typeface="+mn-lt"/>
+                <a:ea typeface="+mn-ea"/>
+                <a:cs typeface="+mn-cs"/>
+              </a:rPr>
+              <a:t>Parties involved:</a:t>
+            </a:r>
+          </a:p>
+          <a:p>
+            <a:pPr lvl="0"/>
+            <a:r>
+              <a:rPr lang="en-US" sz="1200" kern="1200" dirty="0">
+                <a:solidFill>
+                  <a:schemeClr val="tx1"/>
+                </a:solidFill>
+                <a:effectLst/>
+                <a:latin typeface="+mn-lt"/>
+                <a:ea typeface="+mn-ea"/>
+                <a:cs typeface="+mn-cs"/>
+              </a:rPr>
+              <a:t>EZLN</a:t>
+            </a:r>
+          </a:p>
+          <a:p>
+            <a:pPr lvl="0"/>
+            <a:r>
+              <a:rPr lang="en-US" sz="1200" kern="1200" dirty="0">
+                <a:solidFill>
+                  <a:schemeClr val="tx1"/>
+                </a:solidFill>
+                <a:effectLst/>
+                <a:latin typeface="+mn-lt"/>
+                <a:ea typeface="+mn-ea"/>
+                <a:cs typeface="+mn-cs"/>
+              </a:rPr>
+              <a:t>Mexico</a:t>
+            </a:r>
+          </a:p>
+          <a:p>
+            <a:r>
+              <a:rPr lang="en-US" sz="1200" kern="1200" dirty="0">
+                <a:solidFill>
+                  <a:schemeClr val="tx1"/>
+                </a:solidFill>
+                <a:effectLst/>
+                <a:latin typeface="+mn-lt"/>
+                <a:ea typeface="+mn-ea"/>
+                <a:cs typeface="+mn-cs"/>
+              </a:rPr>
+              <a:t> </a:t>
+            </a:r>
+          </a:p>
+          <a:p>
+            <a:r>
+              <a:rPr lang="en-US" sz="1200" u="sng" kern="1200" dirty="0">
+                <a:solidFill>
+                  <a:schemeClr val="tx1"/>
+                </a:solidFill>
+                <a:effectLst/>
+                <a:latin typeface="+mn-lt"/>
+                <a:ea typeface="+mn-ea"/>
+                <a:cs typeface="+mn-cs"/>
+              </a:rPr>
+              <a:t>Mexican Drug War (Dec 2006-present)</a:t>
+            </a:r>
+            <a:endParaRPr lang="en-US" sz="1200" kern="1200" dirty="0">
+              <a:solidFill>
+                <a:schemeClr val="tx1"/>
+              </a:solidFill>
+              <a:effectLst/>
+              <a:latin typeface="+mn-lt"/>
+              <a:ea typeface="+mn-ea"/>
+              <a:cs typeface="+mn-cs"/>
+            </a:endParaRPr>
+          </a:p>
+          <a:p>
+            <a:r>
+              <a:rPr lang="en-US" sz="1200" kern="1200" dirty="0">
+                <a:solidFill>
+                  <a:schemeClr val="tx1"/>
+                </a:solidFill>
+                <a:effectLst/>
+                <a:latin typeface="+mn-lt"/>
+                <a:ea typeface="+mn-ea"/>
+                <a:cs typeface="+mn-cs"/>
+              </a:rPr>
+              <a:t>Location: All over Mexico</a:t>
+            </a:r>
+          </a:p>
+          <a:p>
+            <a:r>
+              <a:rPr lang="en-US" sz="1200" kern="1200" dirty="0">
+                <a:solidFill>
+                  <a:schemeClr val="tx1"/>
+                </a:solidFill>
+                <a:effectLst/>
+                <a:latin typeface="+mn-lt"/>
+                <a:ea typeface="+mn-ea"/>
+                <a:cs typeface="+mn-cs"/>
+              </a:rPr>
+              <a:t>An ongoing, low-intensity conflict between the drug syndicates/cartels and Mexican gov’t that began towards the end of 2006 when the military intervened. The goal was to reduce the drug-related violence throughout all of Mexico and dismantle the cartels- whose influence was only growing. Newest elected president has declared an end to the Mexican war on drugs on 1/30/19 and wants to focus on reducing spending (homicides and violence with the cartels has stayed the same or increased since 2006). He also wants to focus the military/police efforts towards stopping the gasoline thefts that have cost the economy around $3billion.</a:t>
+            </a:r>
+          </a:p>
+          <a:p>
+            <a:r>
+              <a:rPr lang="en-US" sz="1200" kern="1200" dirty="0">
+                <a:solidFill>
+                  <a:schemeClr val="tx1"/>
+                </a:solidFill>
+                <a:effectLst/>
+                <a:latin typeface="+mn-lt"/>
+                <a:ea typeface="+mn-ea"/>
+                <a:cs typeface="+mn-cs"/>
+              </a:rPr>
+              <a:t>Parties involved:</a:t>
+            </a:r>
+          </a:p>
+          <a:p>
+            <a:pPr lvl="0"/>
+            <a:r>
+              <a:rPr lang="en-US" sz="1200" kern="1200" dirty="0">
+                <a:solidFill>
+                  <a:schemeClr val="tx1"/>
+                </a:solidFill>
+                <a:effectLst/>
+                <a:latin typeface="+mn-lt"/>
+                <a:ea typeface="+mn-ea"/>
+                <a:cs typeface="+mn-cs"/>
+              </a:rPr>
+              <a:t>Mexico (armed forces/ federal police/ state and municipal forces/ self-defense groups)</a:t>
+            </a:r>
+          </a:p>
+          <a:p>
+            <a:pPr lvl="0"/>
+            <a:r>
+              <a:rPr lang="en-US" sz="1200" kern="1200" dirty="0">
+                <a:solidFill>
+                  <a:schemeClr val="tx1"/>
+                </a:solidFill>
+                <a:effectLst/>
+                <a:latin typeface="+mn-lt"/>
+                <a:ea typeface="+mn-ea"/>
+                <a:cs typeface="+mn-cs"/>
+              </a:rPr>
+              <a:t>Drug Cartels (Sinaloa Cartel, Gulf Cartel, Knights Templar Cartel, Jalisco New Generation Cartel, La Familia </a:t>
+            </a:r>
+            <a:r>
+              <a:rPr lang="en-US" sz="1200" kern="1200" dirty="0" err="1">
+                <a:solidFill>
+                  <a:schemeClr val="tx1"/>
+                </a:solidFill>
+                <a:effectLst/>
+                <a:latin typeface="+mn-lt"/>
+                <a:ea typeface="+mn-ea"/>
+                <a:cs typeface="+mn-cs"/>
+              </a:rPr>
+              <a:t>Michoacana</a:t>
+            </a:r>
+            <a:r>
+              <a:rPr lang="en-US" sz="1200" kern="1200" dirty="0">
+                <a:solidFill>
+                  <a:schemeClr val="tx1"/>
+                </a:solidFill>
+                <a:effectLst/>
+                <a:latin typeface="+mn-lt"/>
+                <a:ea typeface="+mn-ea"/>
+                <a:cs typeface="+mn-cs"/>
+              </a:rPr>
+              <a:t> [07-11])</a:t>
+            </a:r>
+          </a:p>
+          <a:p>
+            <a:endParaRPr lang="en-US" dirty="0"/>
+          </a:p>
+        </p:txBody>
+      </p:sp>
+      <p:sp>
+        <p:nvSpPr>
+          <p:cNvPr id="4" name="Slide Number Placeholder 3"/>
+          <p:cNvSpPr>
+            <a:spLocks noGrp="1"/>
+          </p:cNvSpPr>
+          <p:nvPr>
+            <p:ph type="sldNum" sz="quarter" idx="5"/>
+          </p:nvPr>
+        </p:nvSpPr>
+        <p:spPr/>
+        <p:txBody>
+          <a:bodyPr/>
+          <a:lstStyle/>
+          <a:p>
+            <a:fld id="{68E58C9F-A835-45F7-A2FB-D97F5C9E2B18}" type="slidenum">
+              <a:rPr lang="en-US" smtClean="0"/>
+              <a:t>16</a:t>
+            </a:fld>
+            <a:endParaRPr lang="en-US"/>
+          </a:p>
+        </p:txBody>
+      </p:sp>
+    </p:spTree>
+    <p:extLst>
+      <p:ext uri="{BB962C8B-B14F-4D97-AF65-F5344CB8AC3E}">
+        <p14:creationId xmlns:p14="http://schemas.microsoft.com/office/powerpoint/2010/main" val="994883640"/>
+      </p:ext>
+    </p:extLst>
+  </p:cSld>
+  <p:clrMapOvr>
+    <a:masterClrMapping/>
+  </p:clrMapOvr>
+</p:notes>
+</file>
+
+<file path=ppt/notesSlides/notesSlide9.xml><?xml version="1.0" encoding="utf-8"?>
+<p:notes xmlns:a="http://schemas.openxmlformats.org/drawingml/2006/main" xmlns:r="http://schemas.openxmlformats.org/officeDocument/2006/relationships" xmlns:p="http://schemas.openxmlformats.org/presentationml/2006/main">
+  <p:cSld>
+    <p:spTree>
+      <p:nvGrpSpPr>
+        <p:cNvPr id="1" name=""/>
+        <p:cNvGrpSpPr/>
+        <p:nvPr/>
+      </p:nvGrpSpPr>
+      <p:grpSpPr>
+        <a:xfrm>
+          <a:off x="0" y="0"/>
+          <a:ext cx="0" cy="0"/>
+          <a:chOff x="0" y="0"/>
+          <a:chExt cx="0" cy="0"/>
+        </a:xfrm>
+      </p:grpSpPr>
+      <p:sp>
+        <p:nvSpPr>
+          <p:cNvPr id="2" name="Slide Image Placeholder 1"/>
+          <p:cNvSpPr>
+            <a:spLocks noGrp="1" noRot="1" noChangeAspect="1"/>
+          </p:cNvSpPr>
+          <p:nvPr>
+            <p:ph type="sldImg"/>
+          </p:nvPr>
+        </p:nvSpPr>
+        <p:spPr/>
+      </p:sp>
+      <p:sp>
+        <p:nvSpPr>
+          <p:cNvPr id="3" name="Notes Placeholder 2"/>
+          <p:cNvSpPr>
+            <a:spLocks noGrp="1"/>
+          </p:cNvSpPr>
+          <p:nvPr>
+            <p:ph type="body" idx="1"/>
+          </p:nvPr>
+        </p:nvSpPr>
+        <p:spPr/>
+        <p:txBody>
+          <a:bodyPr/>
+          <a:lstStyle/>
+          <a:p>
+            <a:r>
+              <a:rPr lang="en-US" sz="1200" b="0" i="0" u="none" strike="noStrike" kern="1200" dirty="0">
+                <a:solidFill>
+                  <a:schemeClr val="tx1"/>
+                </a:solidFill>
+                <a:effectLst/>
+                <a:latin typeface="+mn-lt"/>
+                <a:ea typeface="+mn-ea"/>
+                <a:cs typeface="+mn-cs"/>
+              </a:rPr>
+              <a:t>National Statistics Office (INEGI); Bank of Mexico ; Source of population estimates: UN Population Division's World Population Prospects 2019 PROVISIONAL estimates. Not for circulation. Subject to change.</a:t>
+            </a:r>
+            <a:r>
+              <a:rPr lang="en-US" dirty="0"/>
+              <a:t> </a:t>
+            </a:r>
+          </a:p>
+        </p:txBody>
+      </p:sp>
+      <p:sp>
+        <p:nvSpPr>
+          <p:cNvPr id="4" name="Slide Number Placeholder 3"/>
+          <p:cNvSpPr>
+            <a:spLocks noGrp="1"/>
+          </p:cNvSpPr>
+          <p:nvPr>
+            <p:ph type="sldNum" sz="quarter" idx="5"/>
+          </p:nvPr>
+        </p:nvSpPr>
+        <p:spPr/>
+        <p:txBody>
+          <a:bodyPr/>
+          <a:lstStyle/>
+          <a:p>
+            <a:fld id="{68E58C9F-A835-45F7-A2FB-D97F5C9E2B18}" type="slidenum">
+              <a:rPr lang="en-US" smtClean="0"/>
+              <a:t>19</a:t>
+            </a:fld>
+            <a:endParaRPr lang="en-US"/>
+          </a:p>
+        </p:txBody>
+      </p:sp>
+    </p:spTree>
+    <p:extLst>
+      <p:ext uri="{BB962C8B-B14F-4D97-AF65-F5344CB8AC3E}">
+        <p14:creationId xmlns:p14="http://schemas.microsoft.com/office/powerpoint/2010/main" val="1398493658"/>
       </p:ext>
     </p:extLst>
   </p:cSld>
@@ -12876,7 +15053,7 @@
           <p:nvPr/>
         </p:nvPicPr>
         <p:blipFill>
-          <a:blip r:embed="rId2">
+          <a:blip r:embed="rId3">
             <a:extLst>
               <a:ext uri="{28A0092B-C50C-407E-A947-70E740481C1C}">
                 <a14:useLocalDpi xmlns:a14="http://schemas.microsoft.com/office/drawing/2010/main" val="0"/>
@@ -12923,7 +15100,7 @@
           <p:nvPr/>
         </p:nvPicPr>
         <p:blipFill>
-          <a:blip r:embed="rId3">
+          <a:blip r:embed="rId4">
             <a:extLst>
               <a:ext uri="{28A0092B-C50C-407E-A947-70E740481C1C}">
                 <a14:useLocalDpi xmlns:a14="http://schemas.microsoft.com/office/drawing/2010/main" val="0"/>
@@ -13282,7 +15459,7 @@
           <p:nvPr/>
         </p:nvPicPr>
         <p:blipFill>
-          <a:blip r:embed="rId2">
+          <a:blip r:embed="rId3">
             <a:extLst>
               <a:ext uri="{28A0092B-C50C-407E-A947-70E740481C1C}">
                 <a14:useLocalDpi xmlns:a14="http://schemas.microsoft.com/office/drawing/2010/main" val="0"/>
@@ -13329,7 +15506,7 @@
           <p:nvPr/>
         </p:nvPicPr>
         <p:blipFill>
-          <a:blip r:embed="rId3">
+          <a:blip r:embed="rId4">
             <a:extLst>
               <a:ext uri="{28A0092B-C50C-407E-A947-70E740481C1C}">
                 <a14:useLocalDpi xmlns:a14="http://schemas.microsoft.com/office/drawing/2010/main" val="0"/>
@@ -17562,7 +19739,7 @@
                   <a:srgbClr val="FFFFFF"/>
                 </a:solidFill>
               </a:rPr>
-              <a:t>Plot 1</a:t>
+              <a:t>Mexico’s Military Expenditure in Current USD (billions)</a:t>
             </a:r>
             <a:endParaRPr lang="en-US" sz="3600" dirty="0">
               <a:solidFill>
@@ -17661,7 +19838,7 @@
           <p:nvPr/>
         </p:nvPicPr>
         <p:blipFill>
-          <a:blip r:embed="rId2">
+          <a:blip r:embed="rId3">
             <a:extLst>
               <a:ext uri="{28A0092B-C50C-407E-A947-70E740481C1C}">
                 <a14:useLocalDpi xmlns:a14="http://schemas.microsoft.com/office/drawing/2010/main" val="0"/>
@@ -17693,6 +19870,214 @@
           </a:extLst>
         </p:spPr>
       </p:pic>
+      <p:sp>
+        <p:nvSpPr>
+          <p:cNvPr id="3" name="TextBox 2">
+            <a:extLst>
+              <a:ext uri="{FF2B5EF4-FFF2-40B4-BE49-F238E27FC236}">
+                <a16:creationId xmlns:a16="http://schemas.microsoft.com/office/drawing/2014/main" id="{F5C17BDE-2C0F-4D34-96FA-6F920D123971}"/>
+              </a:ext>
+            </a:extLst>
+          </p:cNvPr>
+          <p:cNvSpPr txBox="1"/>
+          <p:nvPr/>
+        </p:nvSpPr>
+        <p:spPr>
+          <a:xfrm>
+            <a:off x="4851876" y="3059668"/>
+            <a:ext cx="889666" cy="738664"/>
+          </a:xfrm>
+          <a:prstGeom prst="rect">
+            <a:avLst/>
+          </a:prstGeom>
+          <a:noFill/>
+        </p:spPr>
+        <p:txBody>
+          <a:bodyPr wrap="none" rtlCol="0">
+            <a:spAutoFit/>
+          </a:bodyPr>
+          <a:lstStyle/>
+          <a:p>
+            <a:pPr algn="ctr"/>
+            <a:r>
+              <a:rPr lang="en-US" sz="1400" dirty="0"/>
+              <a:t>Zapatista </a:t>
+            </a:r>
+          </a:p>
+          <a:p>
+            <a:pPr algn="ctr"/>
+            <a:r>
+              <a:rPr lang="en-US" sz="1400" dirty="0"/>
+              <a:t>Uprising </a:t>
+            </a:r>
+          </a:p>
+          <a:p>
+            <a:pPr algn="ctr"/>
+            <a:r>
+              <a:rPr lang="en-US" sz="1400" dirty="0"/>
+              <a:t>(1994)</a:t>
+            </a:r>
+          </a:p>
+        </p:txBody>
+      </p:sp>
+      <p:sp>
+        <p:nvSpPr>
+          <p:cNvPr id="4" name="TextBox 3">
+            <a:extLst>
+              <a:ext uri="{FF2B5EF4-FFF2-40B4-BE49-F238E27FC236}">
+                <a16:creationId xmlns:a16="http://schemas.microsoft.com/office/drawing/2014/main" id="{679180A9-1B52-43B3-B1AE-E4245A880BA3}"/>
+              </a:ext>
+            </a:extLst>
+          </p:cNvPr>
+          <p:cNvSpPr txBox="1"/>
+          <p:nvPr/>
+        </p:nvSpPr>
+        <p:spPr>
+          <a:xfrm>
+            <a:off x="6961686" y="3269972"/>
+            <a:ext cx="1202573" cy="769441"/>
+          </a:xfrm>
+          <a:prstGeom prst="rect">
+            <a:avLst/>
+          </a:prstGeom>
+          <a:noFill/>
+        </p:spPr>
+        <p:txBody>
+          <a:bodyPr wrap="none" rtlCol="0">
+            <a:spAutoFit/>
+          </a:bodyPr>
+          <a:lstStyle/>
+          <a:p>
+            <a:pPr algn="ctr"/>
+            <a:r>
+              <a:rPr lang="en-US" sz="1400" dirty="0"/>
+              <a:t>Mexican </a:t>
+            </a:r>
+          </a:p>
+          <a:p>
+            <a:pPr algn="ctr"/>
+            <a:r>
+              <a:rPr lang="en-US" sz="1400" dirty="0"/>
+              <a:t>Drug War </a:t>
+            </a:r>
+          </a:p>
+          <a:p>
+            <a:pPr algn="ctr"/>
+            <a:r>
+              <a:rPr lang="en-US" sz="1400" dirty="0"/>
+              <a:t>(2006 – 2019</a:t>
+            </a:r>
+            <a:r>
+              <a:rPr lang="en-US" sz="1600" dirty="0"/>
+              <a:t>)</a:t>
+            </a:r>
+          </a:p>
+        </p:txBody>
+      </p:sp>
+      <p:sp>
+        <p:nvSpPr>
+          <p:cNvPr id="5" name="Oval 4">
+            <a:extLst>
+              <a:ext uri="{FF2B5EF4-FFF2-40B4-BE49-F238E27FC236}">
+                <a16:creationId xmlns:a16="http://schemas.microsoft.com/office/drawing/2014/main" id="{77FCBBB2-94D8-446D-BA5D-B777E83FB93E}"/>
+              </a:ext>
+            </a:extLst>
+          </p:cNvPr>
+          <p:cNvSpPr/>
+          <p:nvPr/>
+        </p:nvSpPr>
+        <p:spPr>
+          <a:xfrm>
+            <a:off x="6556199" y="3250922"/>
+            <a:ext cx="257712" cy="235228"/>
+          </a:xfrm>
+          <a:prstGeom prst="ellipse">
+            <a:avLst/>
+          </a:prstGeom>
+          <a:noFill/>
+          <a:ln w="19050">
+            <a:solidFill>
+              <a:schemeClr val="accent2"/>
+            </a:solidFill>
+          </a:ln>
+        </p:spPr>
+        <p:style>
+          <a:lnRef idx="2">
+            <a:schemeClr val="accent1">
+              <a:shade val="50000"/>
+            </a:schemeClr>
+          </a:lnRef>
+          <a:fillRef idx="1">
+            <a:schemeClr val="accent1"/>
+          </a:fillRef>
+          <a:effectRef idx="0">
+            <a:schemeClr val="accent1"/>
+          </a:effectRef>
+          <a:fontRef idx="minor">
+            <a:schemeClr val="lt1"/>
+          </a:fontRef>
+        </p:style>
+        <p:txBody>
+          <a:bodyPr rtlCol="0" anchor="ctr"/>
+          <a:lstStyle/>
+          <a:p>
+            <a:pPr algn="ctr"/>
+            <a:endParaRPr lang="en-US"/>
+          </a:p>
+        </p:txBody>
+      </p:sp>
+      <p:sp>
+        <p:nvSpPr>
+          <p:cNvPr id="9" name="Oval 8">
+            <a:extLst>
+              <a:ext uri="{FF2B5EF4-FFF2-40B4-BE49-F238E27FC236}">
+                <a16:creationId xmlns:a16="http://schemas.microsoft.com/office/drawing/2014/main" id="{0511C952-54A4-47F2-B38A-9CBBD709A973}"/>
+              </a:ext>
+            </a:extLst>
+          </p:cNvPr>
+          <p:cNvSpPr/>
+          <p:nvPr/>
+        </p:nvSpPr>
+        <p:spPr>
+          <a:xfrm>
+            <a:off x="5190720" y="3824474"/>
+            <a:ext cx="257712" cy="235228"/>
+          </a:xfrm>
+          <a:prstGeom prst="ellipse">
+            <a:avLst/>
+          </a:prstGeom>
+          <a:noFill/>
+          <a:ln w="19050">
+            <a:solidFill>
+              <a:schemeClr val="accent2"/>
+            </a:solidFill>
+          </a:ln>
+        </p:spPr>
+        <p:style>
+          <a:lnRef idx="2">
+            <a:schemeClr val="accent1">
+              <a:shade val="50000"/>
+            </a:schemeClr>
+          </a:lnRef>
+          <a:fillRef idx="1">
+            <a:schemeClr val="accent1"/>
+          </a:fillRef>
+          <a:effectRef idx="0">
+            <a:schemeClr val="accent1"/>
+          </a:effectRef>
+          <a:fontRef idx="minor">
+            <a:schemeClr val="lt1"/>
+          </a:fontRef>
+        </p:style>
+        <p:txBody>
+          <a:bodyPr rtlCol="0" anchor="ctr"/>
+          <a:lstStyle/>
+          <a:p>
+            <a:pPr algn="ctr"/>
+            <a:endParaRPr lang="en-US"/>
+          </a:p>
+        </p:txBody>
+      </p:sp>
     </p:spTree>
     <p:extLst>
       <p:ext uri="{BB962C8B-B14F-4D97-AF65-F5344CB8AC3E}">
@@ -17828,7 +20213,7 @@
                   <a:srgbClr val="FFFFFF"/>
                 </a:solidFill>
               </a:rPr>
-              <a:t>Plot 2</a:t>
+              <a:t>Mexico’s Military Expenditure as % of GDP</a:t>
             </a:r>
             <a:endParaRPr lang="en-US" sz="3600" dirty="0">
               <a:solidFill>
@@ -17959,6 +20344,214 @@
           </a:extLst>
         </p:spPr>
       </p:pic>
+      <p:sp>
+        <p:nvSpPr>
+          <p:cNvPr id="7" name="TextBox 6">
+            <a:extLst>
+              <a:ext uri="{FF2B5EF4-FFF2-40B4-BE49-F238E27FC236}">
+                <a16:creationId xmlns:a16="http://schemas.microsoft.com/office/drawing/2014/main" id="{089D4C62-2336-4782-A2BE-525232315E8D}"/>
+              </a:ext>
+            </a:extLst>
+          </p:cNvPr>
+          <p:cNvSpPr txBox="1"/>
+          <p:nvPr/>
+        </p:nvSpPr>
+        <p:spPr>
+          <a:xfrm>
+            <a:off x="5054043" y="1155040"/>
+            <a:ext cx="889666" cy="738664"/>
+          </a:xfrm>
+          <a:prstGeom prst="rect">
+            <a:avLst/>
+          </a:prstGeom>
+          <a:noFill/>
+        </p:spPr>
+        <p:txBody>
+          <a:bodyPr wrap="none" rtlCol="0">
+            <a:spAutoFit/>
+          </a:bodyPr>
+          <a:lstStyle/>
+          <a:p>
+            <a:pPr algn="ctr"/>
+            <a:r>
+              <a:rPr lang="en-US" sz="1400" dirty="0"/>
+              <a:t>Zapatista </a:t>
+            </a:r>
+          </a:p>
+          <a:p>
+            <a:pPr algn="ctr"/>
+            <a:r>
+              <a:rPr lang="en-US" sz="1400" dirty="0"/>
+              <a:t>Uprising </a:t>
+            </a:r>
+          </a:p>
+          <a:p>
+            <a:pPr algn="ctr"/>
+            <a:r>
+              <a:rPr lang="en-US" sz="1400" dirty="0"/>
+              <a:t>(1994)</a:t>
+            </a:r>
+          </a:p>
+        </p:txBody>
+      </p:sp>
+      <p:sp>
+        <p:nvSpPr>
+          <p:cNvPr id="8" name="TextBox 7">
+            <a:extLst>
+              <a:ext uri="{FF2B5EF4-FFF2-40B4-BE49-F238E27FC236}">
+                <a16:creationId xmlns:a16="http://schemas.microsoft.com/office/drawing/2014/main" id="{5C3E31F7-4B32-4B08-8ABE-9FFC39CA1DC5}"/>
+              </a:ext>
+            </a:extLst>
+          </p:cNvPr>
+          <p:cNvSpPr txBox="1"/>
+          <p:nvPr/>
+        </p:nvSpPr>
+        <p:spPr>
+          <a:xfrm>
+            <a:off x="6654860" y="4772081"/>
+            <a:ext cx="1202573" cy="769441"/>
+          </a:xfrm>
+          <a:prstGeom prst="rect">
+            <a:avLst/>
+          </a:prstGeom>
+          <a:noFill/>
+        </p:spPr>
+        <p:txBody>
+          <a:bodyPr wrap="none" rtlCol="0">
+            <a:spAutoFit/>
+          </a:bodyPr>
+          <a:lstStyle/>
+          <a:p>
+            <a:pPr algn="ctr"/>
+            <a:r>
+              <a:rPr lang="en-US" sz="1400" dirty="0"/>
+              <a:t>Mexican </a:t>
+            </a:r>
+          </a:p>
+          <a:p>
+            <a:pPr algn="ctr"/>
+            <a:r>
+              <a:rPr lang="en-US" sz="1400" dirty="0"/>
+              <a:t>Drug War </a:t>
+            </a:r>
+          </a:p>
+          <a:p>
+            <a:pPr algn="ctr"/>
+            <a:r>
+              <a:rPr lang="en-US" sz="1400" dirty="0"/>
+              <a:t>(2006 – 2019</a:t>
+            </a:r>
+            <a:r>
+              <a:rPr lang="en-US" sz="1600" dirty="0"/>
+              <a:t>)</a:t>
+            </a:r>
+          </a:p>
+        </p:txBody>
+      </p:sp>
+      <p:sp>
+        <p:nvSpPr>
+          <p:cNvPr id="9" name="Oval 8">
+            <a:extLst>
+              <a:ext uri="{FF2B5EF4-FFF2-40B4-BE49-F238E27FC236}">
+                <a16:creationId xmlns:a16="http://schemas.microsoft.com/office/drawing/2014/main" id="{222D55E0-A273-49A7-9C73-AF520356FE3D}"/>
+              </a:ext>
+            </a:extLst>
+          </p:cNvPr>
+          <p:cNvSpPr/>
+          <p:nvPr/>
+        </p:nvSpPr>
+        <p:spPr>
+          <a:xfrm>
+            <a:off x="6342024" y="5039188"/>
+            <a:ext cx="257712" cy="235228"/>
+          </a:xfrm>
+          <a:prstGeom prst="ellipse">
+            <a:avLst/>
+          </a:prstGeom>
+          <a:noFill/>
+          <a:ln w="19050">
+            <a:solidFill>
+              <a:schemeClr val="accent2"/>
+            </a:solidFill>
+          </a:ln>
+        </p:spPr>
+        <p:style>
+          <a:lnRef idx="2">
+            <a:schemeClr val="accent1">
+              <a:shade val="50000"/>
+            </a:schemeClr>
+          </a:lnRef>
+          <a:fillRef idx="1">
+            <a:schemeClr val="accent1"/>
+          </a:fillRef>
+          <a:effectRef idx="0">
+            <a:schemeClr val="accent1"/>
+          </a:effectRef>
+          <a:fontRef idx="minor">
+            <a:schemeClr val="lt1"/>
+          </a:fontRef>
+        </p:style>
+        <p:txBody>
+          <a:bodyPr rtlCol="0" anchor="ctr"/>
+          <a:lstStyle/>
+          <a:p>
+            <a:pPr algn="ctr"/>
+            <a:endParaRPr lang="en-US"/>
+          </a:p>
+        </p:txBody>
+      </p:sp>
+      <p:sp>
+        <p:nvSpPr>
+          <p:cNvPr id="10" name="Oval 9">
+            <a:extLst>
+              <a:ext uri="{FF2B5EF4-FFF2-40B4-BE49-F238E27FC236}">
+                <a16:creationId xmlns:a16="http://schemas.microsoft.com/office/drawing/2014/main" id="{9C442145-0319-4DC5-BBBA-DA02ECCA598B}"/>
+              </a:ext>
+            </a:extLst>
+          </p:cNvPr>
+          <p:cNvSpPr/>
+          <p:nvPr/>
+        </p:nvSpPr>
+        <p:spPr>
+          <a:xfrm>
+            <a:off x="4733520" y="1183615"/>
+            <a:ext cx="257712" cy="235228"/>
+          </a:xfrm>
+          <a:prstGeom prst="ellipse">
+            <a:avLst/>
+          </a:prstGeom>
+          <a:noFill/>
+          <a:ln w="19050">
+            <a:solidFill>
+              <a:schemeClr val="accent2"/>
+            </a:solidFill>
+          </a:ln>
+        </p:spPr>
+        <p:style>
+          <a:lnRef idx="2">
+            <a:schemeClr val="accent1">
+              <a:shade val="50000"/>
+            </a:schemeClr>
+          </a:lnRef>
+          <a:fillRef idx="1">
+            <a:schemeClr val="accent1"/>
+          </a:fillRef>
+          <a:effectRef idx="0">
+            <a:schemeClr val="accent1"/>
+          </a:effectRef>
+          <a:fontRef idx="minor">
+            <a:schemeClr val="lt1"/>
+          </a:fontRef>
+        </p:style>
+        <p:txBody>
+          <a:bodyPr rtlCol="0" anchor="ctr"/>
+          <a:lstStyle/>
+          <a:p>
+            <a:pPr algn="ctr"/>
+            <a:endParaRPr lang="en-US"/>
+          </a:p>
+        </p:txBody>
+      </p:sp>
     </p:spTree>
     <p:extLst>
       <p:ext uri="{BB962C8B-B14F-4D97-AF65-F5344CB8AC3E}">
@@ -18094,7 +20687,7 @@
                   <a:srgbClr val="FFFFFF"/>
                 </a:solidFill>
               </a:rPr>
-              <a:t>Plot 3</a:t>
+              <a:t>Mexico’s Military Personnel as % of Labor Force</a:t>
             </a:r>
             <a:endParaRPr lang="en-US" sz="3600" dirty="0">
               <a:solidFill>
@@ -18225,6 +20818,214 @@
           </a:extLst>
         </p:spPr>
       </p:pic>
+      <p:sp>
+        <p:nvSpPr>
+          <p:cNvPr id="7" name="TextBox 6">
+            <a:extLst>
+              <a:ext uri="{FF2B5EF4-FFF2-40B4-BE49-F238E27FC236}">
+                <a16:creationId xmlns:a16="http://schemas.microsoft.com/office/drawing/2014/main" id="{2ABC86C5-43D7-411A-AED6-1AB404AB40EB}"/>
+              </a:ext>
+            </a:extLst>
+          </p:cNvPr>
+          <p:cNvSpPr txBox="1"/>
+          <p:nvPr/>
+        </p:nvSpPr>
+        <p:spPr>
+          <a:xfrm>
+            <a:off x="2255368" y="4661598"/>
+            <a:ext cx="889666" cy="738664"/>
+          </a:xfrm>
+          <a:prstGeom prst="rect">
+            <a:avLst/>
+          </a:prstGeom>
+          <a:noFill/>
+        </p:spPr>
+        <p:txBody>
+          <a:bodyPr wrap="none" rtlCol="0">
+            <a:spAutoFit/>
+          </a:bodyPr>
+          <a:lstStyle/>
+          <a:p>
+            <a:pPr algn="ctr"/>
+            <a:r>
+              <a:rPr lang="en-US" sz="1400" dirty="0"/>
+              <a:t>Zapatista </a:t>
+            </a:r>
+          </a:p>
+          <a:p>
+            <a:pPr algn="ctr"/>
+            <a:r>
+              <a:rPr lang="en-US" sz="1400" dirty="0"/>
+              <a:t>Uprising </a:t>
+            </a:r>
+          </a:p>
+          <a:p>
+            <a:pPr algn="ctr"/>
+            <a:r>
+              <a:rPr lang="en-US" sz="1400" dirty="0"/>
+              <a:t>(1994)</a:t>
+            </a:r>
+          </a:p>
+        </p:txBody>
+      </p:sp>
+      <p:sp>
+        <p:nvSpPr>
+          <p:cNvPr id="8" name="TextBox 7">
+            <a:extLst>
+              <a:ext uri="{FF2B5EF4-FFF2-40B4-BE49-F238E27FC236}">
+                <a16:creationId xmlns:a16="http://schemas.microsoft.com/office/drawing/2014/main" id="{7F773B66-6F6B-4770-871F-D3FC8D08B9EA}"/>
+              </a:ext>
+            </a:extLst>
+          </p:cNvPr>
+          <p:cNvSpPr txBox="1"/>
+          <p:nvPr/>
+        </p:nvSpPr>
+        <p:spPr>
+          <a:xfrm>
+            <a:off x="4239201" y="2097990"/>
+            <a:ext cx="1202573" cy="769441"/>
+          </a:xfrm>
+          <a:prstGeom prst="rect">
+            <a:avLst/>
+          </a:prstGeom>
+          <a:noFill/>
+        </p:spPr>
+        <p:txBody>
+          <a:bodyPr wrap="none" rtlCol="0">
+            <a:spAutoFit/>
+          </a:bodyPr>
+          <a:lstStyle/>
+          <a:p>
+            <a:pPr algn="ctr"/>
+            <a:r>
+              <a:rPr lang="en-US" sz="1400" dirty="0"/>
+              <a:t>Mexican </a:t>
+            </a:r>
+          </a:p>
+          <a:p>
+            <a:pPr algn="ctr"/>
+            <a:r>
+              <a:rPr lang="en-US" sz="1400" dirty="0"/>
+              <a:t>Drug War </a:t>
+            </a:r>
+          </a:p>
+          <a:p>
+            <a:pPr algn="ctr"/>
+            <a:r>
+              <a:rPr lang="en-US" sz="1400" dirty="0"/>
+              <a:t>(2006 – 2019</a:t>
+            </a:r>
+            <a:r>
+              <a:rPr lang="en-US" sz="1600" dirty="0"/>
+              <a:t>)</a:t>
+            </a:r>
+          </a:p>
+        </p:txBody>
+      </p:sp>
+      <p:sp>
+        <p:nvSpPr>
+          <p:cNvPr id="9" name="Oval 8">
+            <a:extLst>
+              <a:ext uri="{FF2B5EF4-FFF2-40B4-BE49-F238E27FC236}">
+                <a16:creationId xmlns:a16="http://schemas.microsoft.com/office/drawing/2014/main" id="{02DC42F4-1BD5-4CE2-BDFE-3DFFB70EB0F0}"/>
+              </a:ext>
+            </a:extLst>
+          </p:cNvPr>
+          <p:cNvSpPr/>
+          <p:nvPr/>
+        </p:nvSpPr>
+        <p:spPr>
+          <a:xfrm>
+            <a:off x="5441774" y="2365097"/>
+            <a:ext cx="257712" cy="235228"/>
+          </a:xfrm>
+          <a:prstGeom prst="ellipse">
+            <a:avLst/>
+          </a:prstGeom>
+          <a:noFill/>
+          <a:ln w="19050">
+            <a:solidFill>
+              <a:schemeClr val="accent2"/>
+            </a:solidFill>
+          </a:ln>
+        </p:spPr>
+        <p:style>
+          <a:lnRef idx="2">
+            <a:schemeClr val="accent1">
+              <a:shade val="50000"/>
+            </a:schemeClr>
+          </a:lnRef>
+          <a:fillRef idx="1">
+            <a:schemeClr val="accent1"/>
+          </a:fillRef>
+          <a:effectRef idx="0">
+            <a:schemeClr val="accent1"/>
+          </a:effectRef>
+          <a:fontRef idx="minor">
+            <a:schemeClr val="lt1"/>
+          </a:fontRef>
+        </p:style>
+        <p:txBody>
+          <a:bodyPr rtlCol="0" anchor="ctr"/>
+          <a:lstStyle/>
+          <a:p>
+            <a:pPr algn="ctr"/>
+            <a:endParaRPr lang="en-US"/>
+          </a:p>
+        </p:txBody>
+      </p:sp>
+      <p:sp>
+        <p:nvSpPr>
+          <p:cNvPr id="10" name="Oval 9">
+            <a:extLst>
+              <a:ext uri="{FF2B5EF4-FFF2-40B4-BE49-F238E27FC236}">
+                <a16:creationId xmlns:a16="http://schemas.microsoft.com/office/drawing/2014/main" id="{283D66B0-03E3-42AA-B918-8A7B991E28F8}"/>
+              </a:ext>
+            </a:extLst>
+          </p:cNvPr>
+          <p:cNvSpPr/>
+          <p:nvPr/>
+        </p:nvSpPr>
+        <p:spPr>
+          <a:xfrm>
+            <a:off x="2571345" y="4357874"/>
+            <a:ext cx="257712" cy="235228"/>
+          </a:xfrm>
+          <a:prstGeom prst="ellipse">
+            <a:avLst/>
+          </a:prstGeom>
+          <a:noFill/>
+          <a:ln w="19050">
+            <a:solidFill>
+              <a:schemeClr val="accent2"/>
+            </a:solidFill>
+          </a:ln>
+        </p:spPr>
+        <p:style>
+          <a:lnRef idx="2">
+            <a:schemeClr val="accent1">
+              <a:shade val="50000"/>
+            </a:schemeClr>
+          </a:lnRef>
+          <a:fillRef idx="1">
+            <a:schemeClr val="accent1"/>
+          </a:fillRef>
+          <a:effectRef idx="0">
+            <a:schemeClr val="accent1"/>
+          </a:effectRef>
+          <a:fontRef idx="minor">
+            <a:schemeClr val="lt1"/>
+          </a:fontRef>
+        </p:style>
+        <p:txBody>
+          <a:bodyPr rtlCol="0" anchor="ctr"/>
+          <a:lstStyle/>
+          <a:p>
+            <a:pPr algn="ctr"/>
+            <a:endParaRPr lang="en-US"/>
+          </a:p>
+        </p:txBody>
+      </p:sp>
     </p:spTree>
     <p:extLst>
       <p:ext uri="{BB962C8B-B14F-4D97-AF65-F5344CB8AC3E}">
@@ -18360,7 +21161,7 @@
                   <a:srgbClr val="FFFFFF"/>
                 </a:solidFill>
               </a:rPr>
-              <a:t>Plot 4</a:t>
+              <a:t>Mexico’s Military Arms Import</a:t>
             </a:r>
             <a:endParaRPr lang="en-US" sz="3600" dirty="0">
               <a:solidFill>
@@ -18459,7 +21260,7 @@
           <p:nvPr/>
         </p:nvPicPr>
         <p:blipFill>
-          <a:blip r:embed="rId2">
+          <a:blip r:embed="rId3">
             <a:extLst>
               <a:ext uri="{28A0092B-C50C-407E-A947-70E740481C1C}">
                 <a14:useLocalDpi xmlns:a14="http://schemas.microsoft.com/office/drawing/2010/main" val="0"/>
@@ -18491,6 +21292,214 @@
           </a:extLst>
         </p:spPr>
       </p:pic>
+      <p:sp>
+        <p:nvSpPr>
+          <p:cNvPr id="7" name="TextBox 6">
+            <a:extLst>
+              <a:ext uri="{FF2B5EF4-FFF2-40B4-BE49-F238E27FC236}">
+                <a16:creationId xmlns:a16="http://schemas.microsoft.com/office/drawing/2014/main" id="{CC3866A2-AE27-4DD4-97E1-6CEA5FCA77B4}"/>
+              </a:ext>
+            </a:extLst>
+          </p:cNvPr>
+          <p:cNvSpPr txBox="1"/>
+          <p:nvPr/>
+        </p:nvSpPr>
+        <p:spPr>
+          <a:xfrm>
+            <a:off x="4508315" y="3066756"/>
+            <a:ext cx="889666" cy="738664"/>
+          </a:xfrm>
+          <a:prstGeom prst="rect">
+            <a:avLst/>
+          </a:prstGeom>
+          <a:noFill/>
+        </p:spPr>
+        <p:txBody>
+          <a:bodyPr wrap="none" rtlCol="0">
+            <a:spAutoFit/>
+          </a:bodyPr>
+          <a:lstStyle/>
+          <a:p>
+            <a:pPr algn="ctr"/>
+            <a:r>
+              <a:rPr lang="en-US" sz="1400" dirty="0"/>
+              <a:t>Zapatista </a:t>
+            </a:r>
+          </a:p>
+          <a:p>
+            <a:pPr algn="ctr"/>
+            <a:r>
+              <a:rPr lang="en-US" sz="1400" dirty="0"/>
+              <a:t>Uprising </a:t>
+            </a:r>
+          </a:p>
+          <a:p>
+            <a:pPr algn="ctr"/>
+            <a:r>
+              <a:rPr lang="en-US" sz="1400" dirty="0"/>
+              <a:t>(1994)</a:t>
+            </a:r>
+          </a:p>
+        </p:txBody>
+      </p:sp>
+      <p:sp>
+        <p:nvSpPr>
+          <p:cNvPr id="8" name="TextBox 7">
+            <a:extLst>
+              <a:ext uri="{FF2B5EF4-FFF2-40B4-BE49-F238E27FC236}">
+                <a16:creationId xmlns:a16="http://schemas.microsoft.com/office/drawing/2014/main" id="{B1B6BD70-7E10-40ED-A49D-FA8CFE7CDFAC}"/>
+              </a:ext>
+            </a:extLst>
+          </p:cNvPr>
+          <p:cNvSpPr txBox="1"/>
+          <p:nvPr/>
+        </p:nvSpPr>
+        <p:spPr>
+          <a:xfrm>
+            <a:off x="6333036" y="2246523"/>
+            <a:ext cx="1202573" cy="769441"/>
+          </a:xfrm>
+          <a:prstGeom prst="rect">
+            <a:avLst/>
+          </a:prstGeom>
+          <a:noFill/>
+        </p:spPr>
+        <p:txBody>
+          <a:bodyPr wrap="none" rtlCol="0">
+            <a:spAutoFit/>
+          </a:bodyPr>
+          <a:lstStyle/>
+          <a:p>
+            <a:pPr algn="ctr"/>
+            <a:r>
+              <a:rPr lang="en-US" sz="1400" dirty="0"/>
+              <a:t>Mexican </a:t>
+            </a:r>
+          </a:p>
+          <a:p>
+            <a:pPr algn="ctr"/>
+            <a:r>
+              <a:rPr lang="en-US" sz="1400" dirty="0"/>
+              <a:t>Drug War </a:t>
+            </a:r>
+          </a:p>
+          <a:p>
+            <a:pPr algn="ctr"/>
+            <a:r>
+              <a:rPr lang="en-US" sz="1400" dirty="0"/>
+              <a:t>(2006 – 2019</a:t>
+            </a:r>
+            <a:r>
+              <a:rPr lang="en-US" sz="1600" dirty="0"/>
+              <a:t>)</a:t>
+            </a:r>
+          </a:p>
+        </p:txBody>
+      </p:sp>
+      <p:sp>
+        <p:nvSpPr>
+          <p:cNvPr id="9" name="Oval 8">
+            <a:extLst>
+              <a:ext uri="{FF2B5EF4-FFF2-40B4-BE49-F238E27FC236}">
+                <a16:creationId xmlns:a16="http://schemas.microsoft.com/office/drawing/2014/main" id="{11307848-4102-43CB-A46D-64B81E9EB2CB}"/>
+              </a:ext>
+            </a:extLst>
+          </p:cNvPr>
+          <p:cNvSpPr/>
+          <p:nvPr/>
+        </p:nvSpPr>
+        <p:spPr>
+          <a:xfrm>
+            <a:off x="6418087" y="4465360"/>
+            <a:ext cx="257712" cy="235228"/>
+          </a:xfrm>
+          <a:prstGeom prst="ellipse">
+            <a:avLst/>
+          </a:prstGeom>
+          <a:noFill/>
+          <a:ln w="19050">
+            <a:solidFill>
+              <a:schemeClr val="accent2"/>
+            </a:solidFill>
+          </a:ln>
+        </p:spPr>
+        <p:style>
+          <a:lnRef idx="2">
+            <a:schemeClr val="accent1">
+              <a:shade val="50000"/>
+            </a:schemeClr>
+          </a:lnRef>
+          <a:fillRef idx="1">
+            <a:schemeClr val="accent1"/>
+          </a:fillRef>
+          <a:effectRef idx="0">
+            <a:schemeClr val="accent1"/>
+          </a:effectRef>
+          <a:fontRef idx="minor">
+            <a:schemeClr val="lt1"/>
+          </a:fontRef>
+        </p:style>
+        <p:txBody>
+          <a:bodyPr rtlCol="0" anchor="ctr"/>
+          <a:lstStyle/>
+          <a:p>
+            <a:pPr algn="ctr"/>
+            <a:endParaRPr lang="en-US"/>
+          </a:p>
+        </p:txBody>
+      </p:sp>
+      <p:sp>
+        <p:nvSpPr>
+          <p:cNvPr id="10" name="Oval 9">
+            <a:extLst>
+              <a:ext uri="{FF2B5EF4-FFF2-40B4-BE49-F238E27FC236}">
+                <a16:creationId xmlns:a16="http://schemas.microsoft.com/office/drawing/2014/main" id="{14393CAA-82B2-449F-A325-F8152A59630B}"/>
+              </a:ext>
+            </a:extLst>
+          </p:cNvPr>
+          <p:cNvSpPr/>
+          <p:nvPr/>
+        </p:nvSpPr>
+        <p:spPr>
+          <a:xfrm>
+            <a:off x="4953148" y="4047736"/>
+            <a:ext cx="257712" cy="235228"/>
+          </a:xfrm>
+          <a:prstGeom prst="ellipse">
+            <a:avLst/>
+          </a:prstGeom>
+          <a:noFill/>
+          <a:ln w="19050">
+            <a:solidFill>
+              <a:schemeClr val="accent2"/>
+            </a:solidFill>
+          </a:ln>
+        </p:spPr>
+        <p:style>
+          <a:lnRef idx="2">
+            <a:schemeClr val="accent1">
+              <a:shade val="50000"/>
+            </a:schemeClr>
+          </a:lnRef>
+          <a:fillRef idx="1">
+            <a:schemeClr val="accent1"/>
+          </a:fillRef>
+          <a:effectRef idx="0">
+            <a:schemeClr val="accent1"/>
+          </a:effectRef>
+          <a:fontRef idx="minor">
+            <a:schemeClr val="lt1"/>
+          </a:fontRef>
+        </p:style>
+        <p:txBody>
+          <a:bodyPr rtlCol="0" anchor="ctr"/>
+          <a:lstStyle/>
+          <a:p>
+            <a:pPr algn="ctr"/>
+            <a:endParaRPr lang="en-US"/>
+          </a:p>
+        </p:txBody>
+      </p:sp>
     </p:spTree>
     <p:extLst>
       <p:ext uri="{BB962C8B-B14F-4D97-AF65-F5344CB8AC3E}">
@@ -20092,7 +23101,7 @@
             <p:ph idx="1"/>
             <p:extLst>
               <p:ext uri="{D42A27DB-BD31-4B8C-83A1-F6EECF244321}">
-                <p14:modId xmlns:p14="http://schemas.microsoft.com/office/powerpoint/2010/main" val="2506724609"/>
+                <p14:modId xmlns:p14="http://schemas.microsoft.com/office/powerpoint/2010/main" val="3205512116"/>
               </p:ext>
             </p:extLst>
           </p:nvPr>
@@ -20677,7 +23686,7 @@
           <p:nvPr/>
         </p:nvPicPr>
         <p:blipFill>
-          <a:blip r:embed="rId2">
+          <a:blip r:embed="rId3">
             <a:extLst>
               <a:ext uri="{28A0092B-C50C-407E-A947-70E740481C1C}">
                 <a14:useLocalDpi xmlns:a14="http://schemas.microsoft.com/office/drawing/2010/main" val="0"/>
@@ -20797,7 +23806,7 @@
           <p:nvPr/>
         </p:nvPicPr>
         <p:blipFill>
-          <a:blip r:embed="rId3">
+          <a:blip r:embed="rId4">
             <a:extLst>
               <a:ext uri="{28A0092B-C50C-407E-A947-70E740481C1C}">
                 <a14:useLocalDpi xmlns:a14="http://schemas.microsoft.com/office/drawing/2010/main" val="0"/>
@@ -21162,7 +24171,7 @@
           <p:nvPr/>
         </p:nvPicPr>
         <p:blipFill>
-          <a:blip r:embed="rId2">
+          <a:blip r:embed="rId3">
             <a:extLst>
               <a:ext uri="{28A0092B-C50C-407E-A947-70E740481C1C}">
                 <a14:useLocalDpi xmlns:a14="http://schemas.microsoft.com/office/drawing/2010/main" val="0"/>
@@ -21208,7 +24217,7 @@
           <p:nvPr/>
         </p:nvPicPr>
         <p:blipFill>
-          <a:blip r:embed="rId3">
+          <a:blip r:embed="rId4">
             <a:extLst>
               <a:ext uri="{28A0092B-C50C-407E-A947-70E740481C1C}">
                 <a14:useLocalDpi xmlns:a14="http://schemas.microsoft.com/office/drawing/2010/main" val="0"/>

</xml_diff>